<commit_message>
diag arg slide to cantor.pptx
</commit_message>
<xml_diff>
--- a/spring12/slidesS12/cantor.pptx
+++ b/spring12/slidesS12/cantor.pptx
@@ -6,10 +6,10 @@
     <p:sldMasterId id="2147483664" r:id="rId2"/>
   </p:sldMasterIdLst>
   <p:notesMasterIdLst>
-    <p:notesMasterId r:id="rId17"/>
+    <p:notesMasterId r:id="rId21"/>
   </p:notesMasterIdLst>
   <p:handoutMasterIdLst>
-    <p:handoutMasterId r:id="rId18"/>
+    <p:handoutMasterId r:id="rId22"/>
   </p:handoutMasterIdLst>
   <p:sldIdLst>
     <p:sldId id="257" r:id="rId3"/>
@@ -23,14 +23,18 @@
     <p:sldId id="362" r:id="rId11"/>
     <p:sldId id="382" r:id="rId12"/>
     <p:sldId id="348" r:id="rId13"/>
-    <p:sldId id="388" r:id="rId14"/>
-    <p:sldId id="387" r:id="rId15"/>
-    <p:sldId id="349" r:id="rId16"/>
+    <p:sldId id="390" r:id="rId14"/>
+    <p:sldId id="395" r:id="rId15"/>
+    <p:sldId id="396" r:id="rId16"/>
+    <p:sldId id="397" r:id="rId17"/>
+    <p:sldId id="388" r:id="rId18"/>
+    <p:sldId id="387" r:id="rId19"/>
+    <p:sldId id="349" r:id="rId20"/>
   </p:sldIdLst>
   <p:sldSz cx="9144000" cy="6858000" type="screen4x3"/>
   <p:notesSz cx="9601200" cy="7315200"/>
   <p:custDataLst>
-    <p:tags r:id="rId20"/>
+    <p:tags r:id="rId24"/>
   </p:custDataLst>
   <p:defaultTextStyle>
     <a:defPPr>
@@ -911,6 +915,252 @@
 </p:notes>
 </file>
 
+<file path=ppt/notesSlides/notesSlide10.xml><?xml version="1.0" encoding="utf-8"?>
+<p:notes xmlns:a="http://schemas.openxmlformats.org/drawingml/2006/main" xmlns:r="http://schemas.openxmlformats.org/officeDocument/2006/relationships" xmlns:p="http://schemas.openxmlformats.org/presentationml/2006/main">
+  <p:cSld>
+    <p:spTree>
+      <p:nvGrpSpPr>
+        <p:cNvPr id="1" name=""/>
+        <p:cNvGrpSpPr/>
+        <p:nvPr/>
+      </p:nvGrpSpPr>
+      <p:grpSpPr>
+        <a:xfrm>
+          <a:off x="0" y="0"/>
+          <a:ext cx="0" cy="0"/>
+          <a:chOff x="0" y="0"/>
+          <a:chExt cx="0" cy="0"/>
+        </a:xfrm>
+      </p:grpSpPr>
+      <p:sp>
+        <p:nvSpPr>
+          <p:cNvPr id="2" name="Slide Image Placeholder 1"/>
+          <p:cNvSpPr>
+            <a:spLocks noGrp="1" noRot="1" noChangeAspect="1"/>
+          </p:cNvSpPr>
+          <p:nvPr>
+            <p:ph type="sldImg"/>
+          </p:nvPr>
+        </p:nvSpPr>
+        <p:spPr/>
+      </p:sp>
+      <p:sp>
+        <p:nvSpPr>
+          <p:cNvPr id="3" name="Notes Placeholder 2"/>
+          <p:cNvSpPr>
+            <a:spLocks noGrp="1"/>
+          </p:cNvSpPr>
+          <p:nvPr>
+            <p:ph type="body" idx="1"/>
+          </p:nvPr>
+        </p:nvSpPr>
+        <p:spPr/>
+        <p:txBody>
+          <a:bodyPr>
+            <a:normAutofit/>
+          </a:bodyPr>
+          <a:lstStyle/>
+          <a:p>
+            <a:endParaRPr lang="en-US" dirty="0"/>
+          </a:p>
+        </p:txBody>
+      </p:sp>
+      <p:sp>
+        <p:nvSpPr>
+          <p:cNvPr id="4" name="Slide Number Placeholder 3"/>
+          <p:cNvSpPr>
+            <a:spLocks noGrp="1"/>
+          </p:cNvSpPr>
+          <p:nvPr>
+            <p:ph type="sldNum" sz="quarter" idx="10"/>
+          </p:nvPr>
+        </p:nvSpPr>
+        <p:spPr/>
+        <p:txBody>
+          <a:bodyPr/>
+          <a:lstStyle/>
+          <a:p>
+            <a:fld id="{A02B9F3F-3042-489F-AF35-1A733968F079}" type="slidenum">
+              <a:rPr lang="en-US" smtClean="0"/>
+              <a:pPr/>
+              <a:t>16</a:t>
+            </a:fld>
+            <a:endParaRPr lang="en-US" dirty="0"/>
+          </a:p>
+        </p:txBody>
+      </p:sp>
+    </p:spTree>
+  </p:cSld>
+  <p:clrMapOvr>
+    <a:masterClrMapping/>
+  </p:clrMapOvr>
+</p:notes>
+</file>
+
+<file path=ppt/notesSlides/notesSlide11.xml><?xml version="1.0" encoding="utf-8"?>
+<p:notes xmlns:a="http://schemas.openxmlformats.org/drawingml/2006/main" xmlns:r="http://schemas.openxmlformats.org/officeDocument/2006/relationships" xmlns:p="http://schemas.openxmlformats.org/presentationml/2006/main">
+  <p:cSld>
+    <p:spTree>
+      <p:nvGrpSpPr>
+        <p:cNvPr id="1" name=""/>
+        <p:cNvGrpSpPr/>
+        <p:nvPr/>
+      </p:nvGrpSpPr>
+      <p:grpSpPr>
+        <a:xfrm>
+          <a:off x="0" y="0"/>
+          <a:ext cx="0" cy="0"/>
+          <a:chOff x="0" y="0"/>
+          <a:chExt cx="0" cy="0"/>
+        </a:xfrm>
+      </p:grpSpPr>
+      <p:sp>
+        <p:nvSpPr>
+          <p:cNvPr id="2" name="Slide Image Placeholder 1"/>
+          <p:cNvSpPr>
+            <a:spLocks noGrp="1" noRot="1" noChangeAspect="1"/>
+          </p:cNvSpPr>
+          <p:nvPr>
+            <p:ph type="sldImg"/>
+          </p:nvPr>
+        </p:nvSpPr>
+        <p:spPr/>
+      </p:sp>
+      <p:sp>
+        <p:nvSpPr>
+          <p:cNvPr id="3" name="Notes Placeholder 2"/>
+          <p:cNvSpPr>
+            <a:spLocks noGrp="1"/>
+          </p:cNvSpPr>
+          <p:nvPr>
+            <p:ph type="body" idx="1"/>
+          </p:nvPr>
+        </p:nvSpPr>
+        <p:spPr/>
+        <p:txBody>
+          <a:bodyPr>
+            <a:normAutofit/>
+          </a:bodyPr>
+          <a:lstStyle/>
+          <a:p>
+            <a:endParaRPr lang="en-US" dirty="0"/>
+          </a:p>
+        </p:txBody>
+      </p:sp>
+      <p:sp>
+        <p:nvSpPr>
+          <p:cNvPr id="4" name="Slide Number Placeholder 3"/>
+          <p:cNvSpPr>
+            <a:spLocks noGrp="1"/>
+          </p:cNvSpPr>
+          <p:nvPr>
+            <p:ph type="sldNum" sz="quarter" idx="10"/>
+          </p:nvPr>
+        </p:nvSpPr>
+        <p:spPr/>
+        <p:txBody>
+          <a:bodyPr/>
+          <a:lstStyle/>
+          <a:p>
+            <a:fld id="{A02B9F3F-3042-489F-AF35-1A733968F079}" type="slidenum">
+              <a:rPr lang="en-US" smtClean="0"/>
+              <a:pPr/>
+              <a:t>17</a:t>
+            </a:fld>
+            <a:endParaRPr lang="en-US" dirty="0"/>
+          </a:p>
+        </p:txBody>
+      </p:sp>
+    </p:spTree>
+  </p:cSld>
+  <p:clrMapOvr>
+    <a:masterClrMapping/>
+  </p:clrMapOvr>
+</p:notes>
+</file>
+
+<file path=ppt/notesSlides/notesSlide12.xml><?xml version="1.0" encoding="utf-8"?>
+<p:notes xmlns:a="http://schemas.openxmlformats.org/drawingml/2006/main" xmlns:r="http://schemas.openxmlformats.org/officeDocument/2006/relationships" xmlns:p="http://schemas.openxmlformats.org/presentationml/2006/main">
+  <p:cSld>
+    <p:spTree>
+      <p:nvGrpSpPr>
+        <p:cNvPr id="1" name=""/>
+        <p:cNvGrpSpPr/>
+        <p:nvPr/>
+      </p:nvGrpSpPr>
+      <p:grpSpPr>
+        <a:xfrm>
+          <a:off x="0" y="0"/>
+          <a:ext cx="0" cy="0"/>
+          <a:chOff x="0" y="0"/>
+          <a:chExt cx="0" cy="0"/>
+        </a:xfrm>
+      </p:grpSpPr>
+      <p:sp>
+        <p:nvSpPr>
+          <p:cNvPr id="2" name="Slide Image Placeholder 1"/>
+          <p:cNvSpPr>
+            <a:spLocks noGrp="1" noRot="1" noChangeAspect="1"/>
+          </p:cNvSpPr>
+          <p:nvPr>
+            <p:ph type="sldImg"/>
+          </p:nvPr>
+        </p:nvSpPr>
+        <p:spPr/>
+      </p:sp>
+      <p:sp>
+        <p:nvSpPr>
+          <p:cNvPr id="3" name="Notes Placeholder 2"/>
+          <p:cNvSpPr>
+            <a:spLocks noGrp="1"/>
+          </p:cNvSpPr>
+          <p:nvPr>
+            <p:ph type="body" idx="1"/>
+          </p:nvPr>
+        </p:nvSpPr>
+        <p:spPr/>
+        <p:txBody>
+          <a:bodyPr>
+            <a:normAutofit/>
+          </a:bodyPr>
+          <a:lstStyle/>
+          <a:p>
+            <a:endParaRPr lang="en-US" dirty="0"/>
+          </a:p>
+        </p:txBody>
+      </p:sp>
+      <p:sp>
+        <p:nvSpPr>
+          <p:cNvPr id="4" name="Slide Number Placeholder 3"/>
+          <p:cNvSpPr>
+            <a:spLocks noGrp="1"/>
+          </p:cNvSpPr>
+          <p:nvPr>
+            <p:ph type="sldNum" sz="quarter" idx="10"/>
+          </p:nvPr>
+        </p:nvSpPr>
+        <p:spPr/>
+        <p:txBody>
+          <a:bodyPr/>
+          <a:lstStyle/>
+          <a:p>
+            <a:fld id="{A02B9F3F-3042-489F-AF35-1A733968F079}" type="slidenum">
+              <a:rPr lang="en-US" smtClean="0"/>
+              <a:pPr/>
+              <a:t>18</a:t>
+            </a:fld>
+            <a:endParaRPr lang="en-US" dirty="0"/>
+          </a:p>
+        </p:txBody>
+      </p:sp>
+    </p:spTree>
+  </p:cSld>
+  <p:clrMapOvr>
+    <a:masterClrMapping/>
+  </p:clrMapOvr>
+</p:notes>
+</file>
+
 <file path=ppt/notesSlides/notesSlide2.xml><?xml version="1.0" encoding="utf-8"?>
 <p:notes xmlns:a="http://schemas.openxmlformats.org/drawingml/2006/main" xmlns:r="http://schemas.openxmlformats.org/officeDocument/2006/relationships" xmlns:p="http://schemas.openxmlformats.org/presentationml/2006/main">
   <p:cSld>
@@ -1472,6 +1722,88 @@
               <a:rPr lang="en-US" smtClean="0"/>
               <a:pPr/>
               <a:t>14</a:t>
+            </a:fld>
+            <a:endParaRPr lang="en-US" dirty="0"/>
+          </a:p>
+        </p:txBody>
+      </p:sp>
+    </p:spTree>
+  </p:cSld>
+  <p:clrMapOvr>
+    <a:masterClrMapping/>
+  </p:clrMapOvr>
+</p:notes>
+</file>
+
+<file path=ppt/notesSlides/notesSlide9.xml><?xml version="1.0" encoding="utf-8"?>
+<p:notes xmlns:a="http://schemas.openxmlformats.org/drawingml/2006/main" xmlns:r="http://schemas.openxmlformats.org/officeDocument/2006/relationships" xmlns:p="http://schemas.openxmlformats.org/presentationml/2006/main">
+  <p:cSld>
+    <p:spTree>
+      <p:nvGrpSpPr>
+        <p:cNvPr id="1" name=""/>
+        <p:cNvGrpSpPr/>
+        <p:nvPr/>
+      </p:nvGrpSpPr>
+      <p:grpSpPr>
+        <a:xfrm>
+          <a:off x="0" y="0"/>
+          <a:ext cx="0" cy="0"/>
+          <a:chOff x="0" y="0"/>
+          <a:chExt cx="0" cy="0"/>
+        </a:xfrm>
+      </p:grpSpPr>
+      <p:sp>
+        <p:nvSpPr>
+          <p:cNvPr id="2" name="Slide Image Placeholder 1"/>
+          <p:cNvSpPr>
+            <a:spLocks noGrp="1" noRot="1" noChangeAspect="1"/>
+          </p:cNvSpPr>
+          <p:nvPr>
+            <p:ph type="sldImg"/>
+          </p:nvPr>
+        </p:nvSpPr>
+        <p:spPr/>
+      </p:sp>
+      <p:sp>
+        <p:nvSpPr>
+          <p:cNvPr id="3" name="Notes Placeholder 2"/>
+          <p:cNvSpPr>
+            <a:spLocks noGrp="1"/>
+          </p:cNvSpPr>
+          <p:nvPr>
+            <p:ph type="body" idx="1"/>
+          </p:nvPr>
+        </p:nvSpPr>
+        <p:spPr/>
+        <p:txBody>
+          <a:bodyPr>
+            <a:normAutofit/>
+          </a:bodyPr>
+          <a:lstStyle/>
+          <a:p>
+            <a:endParaRPr lang="en-US" dirty="0"/>
+          </a:p>
+        </p:txBody>
+      </p:sp>
+      <p:sp>
+        <p:nvSpPr>
+          <p:cNvPr id="4" name="Slide Number Placeholder 3"/>
+          <p:cNvSpPr>
+            <a:spLocks noGrp="1"/>
+          </p:cNvSpPr>
+          <p:nvPr>
+            <p:ph type="sldNum" sz="quarter" idx="10"/>
+          </p:nvPr>
+        </p:nvSpPr>
+        <p:spPr/>
+        <p:txBody>
+          <a:bodyPr/>
+          <a:lstStyle/>
+          <a:p>
+            <a:fld id="{A02B9F3F-3042-489F-AF35-1A733968F079}" type="slidenum">
+              <a:rPr lang="en-US" smtClean="0"/>
+              <a:pPr/>
+              <a:t>15</a:t>
             </a:fld>
             <a:endParaRPr lang="en-US" dirty="0"/>
           </a:p>
@@ -7050,10 +7382,10 @@
   </p:clrMapOvr>
   <mc:AlternateContent xmlns:mc="http://schemas.openxmlformats.org/markup-compatibility/2006" xmlns:p14="http://schemas.microsoft.com/office/powerpoint/2010/main">
     <mc:Choice Requires="p14">
-      <p:transition spd="slow" p14:dur="2000" advTm="47159"/>
+      <p:transition spd="slow" p14:dur="2000"/>
     </mc:Choice>
     <mc:Fallback xmlns="">
-      <p:transition xmlns:p14="http://schemas.microsoft.com/office/powerpoint/2010/main" spd="slow" advTm="47159"/>
+      <p:transition xmlns:p14="http://schemas.microsoft.com/office/powerpoint/2010/main" spd="slow"/>
     </mc:Fallback>
   </mc:AlternateContent>
   <p:timing>
@@ -7215,7 +7547,7 @@
   <p:clrMapOvr>
     <a:masterClrMapping/>
   </p:clrMapOvr>
-  <p:transition xmlns:p14="http://schemas.microsoft.com/office/powerpoint/2010/main" spd="slow" advTm="24718">
+  <p:transition xmlns:p14="http://schemas.microsoft.com/office/powerpoint/2010/main" spd="slow">
     <p:fade thruBlk="1"/>
   </p:transition>
   <p:timing>
@@ -7601,7 +7933,7 @@
               <a:t>D::= {a </a:t>
             </a:r>
             <a:r>
-              <a:rPr lang="en-US" sz="5400" b="1" dirty="0" smtClean="0">
+              <a:rPr lang="en-US" sz="5400" dirty="0" smtClean="0">
                 <a:solidFill>
                   <a:srgbClr val="0000FF"/>
                 </a:solidFill>
@@ -7792,7 +8124,7 @@
           <a:graphicData uri="http://schemas.openxmlformats.org/presentationml/2006/ole">
             <mc:AlternateContent xmlns:mc="http://schemas.openxmlformats.org/markup-compatibility/2006">
               <mc:Choice xmlns:v="urn:schemas-microsoft-com:vml" Requires="v">
-                <p:oleObj spid="_x0000_s79896" name="Equation" r:id="rId5" imgW="889000" imgH="228600" progId="Equation.DSMT4">
+                <p:oleObj spid="_x0000_s79907" name="Equation" r:id="rId5" imgW="889000" imgH="228600" progId="Equation.DSMT4">
                   <p:embed/>
                 </p:oleObj>
               </mc:Choice>
@@ -7837,12 +8169,12 @@
   </p:clrMapOvr>
   <mc:AlternateContent xmlns:mc="http://schemas.openxmlformats.org/markup-compatibility/2006" xmlns:p14="http://schemas.microsoft.com/office/powerpoint/2010/main">
     <mc:Choice Requires="p14">
-      <p:transition spd="slow" p14:dur="1050" advTm="100254">
+      <p:transition spd="slow" p14:dur="1050">
         <p:fade/>
       </p:transition>
     </mc:Choice>
     <mc:Fallback xmlns="">
-      <p:transition xmlns:p14="http://schemas.microsoft.com/office/powerpoint/2010/main" spd="slow" advTm="100254">
+      <p:transition xmlns:p14="http://schemas.microsoft.com/office/powerpoint/2010/main" spd="slow">
         <p:fade/>
       </p:transition>
     </mc:Fallback>
@@ -8346,82 +8678,445 @@
         </p:nvSpPr>
         <p:spPr>
           <a:xfrm>
-            <a:off x="589592" y="1664588"/>
-            <a:ext cx="7967992" cy="3954596"/>
+            <a:off x="185742" y="2299778"/>
+            <a:ext cx="8800728" cy="1975717"/>
           </a:xfrm>
         </p:spPr>
         <p:txBody>
           <a:bodyPr/>
           <a:lstStyle/>
           <a:p>
+            <a:pPr algn="ctr"/>
             <a:r>
               <a:rPr lang="en-US" sz="5400" dirty="0" smtClean="0">
                 <a:solidFill>
-                  <a:schemeClr val="tx2"/>
-                </a:solidFill>
-              </a:rPr>
-              <a:t>So no </a:t>
+                  <a:srgbClr val="0000FF"/>
+                </a:solidFill>
+              </a:rPr>
+              <a:t>   a </a:t>
             </a:r>
             <a:r>
               <a:rPr lang="en-US" sz="5400" dirty="0" smtClean="0">
                 <a:solidFill>
                   <a:srgbClr val="0000FF"/>
                 </a:solidFill>
-              </a:rPr>
-              <a:t>f</a:t>
+                <a:latin typeface="Symbol" charset="2"/>
+                <a:cs typeface="Symbol" charset="2"/>
+              </a:rPr>
+              <a:t>∈</a:t>
             </a:r>
             <a:r>
               <a:rPr lang="en-US" sz="5400" dirty="0" smtClean="0">
                 <a:solidFill>
-                  <a:schemeClr val="tx2"/>
-                </a:solidFill>
-              </a:rPr>
-              <a:t>-arrow into</a:t>
+                  <a:srgbClr val="0000FF"/>
+                </a:solidFill>
+              </a:rPr>
+              <a:t>D       </a:t>
+            </a:r>
+            <a:r>
+              <a:rPr lang="en-US" sz="4400" dirty="0" smtClean="0">
+                <a:solidFill>
+                  <a:srgbClr val="000000"/>
+                </a:solidFill>
+              </a:rPr>
+              <a:t>IFF</a:t>
             </a:r>
             <a:r>
               <a:rPr lang="en-US" sz="5400" dirty="0" smtClean="0">
                 <a:solidFill>
+                  <a:srgbClr val="000000"/>
+                </a:solidFill>
+              </a:rPr>
+              <a:t>  </a:t>
+            </a:r>
+            <a:r>
+              <a:rPr lang="en-US" sz="5400" dirty="0" smtClean="0">
+                <a:solidFill>
                   <a:srgbClr val="0000FF"/>
                 </a:solidFill>
               </a:rPr>
+              <a:t> </a:t>
+            </a:r>
+            <a:r>
+              <a:rPr lang="en-US" sz="5400" dirty="0" smtClean="0">
+                <a:solidFill>
+                  <a:srgbClr val="0000FF"/>
+                </a:solidFill>
+              </a:rPr>
+              <a:t>a </a:t>
+            </a:r>
+            <a:r>
+              <a:rPr lang="en-US" sz="5400" dirty="0" smtClean="0">
+                <a:solidFill>
+                  <a:srgbClr val="0000FF"/>
+                </a:solidFill>
+                <a:latin typeface="Symbol" charset="2"/>
+                <a:cs typeface="Symbol" charset="2"/>
+                <a:sym typeface="Euclid Symbol"/>
+              </a:rPr>
+              <a:t>∉</a:t>
+            </a:r>
+            <a:r>
+              <a:rPr lang="en-US" sz="5400" dirty="0" smtClean="0">
+                <a:solidFill>
+                  <a:srgbClr val="0000FF"/>
+                </a:solidFill>
+              </a:rPr>
+              <a:t> f(a</a:t>
+            </a:r>
+            <a:r>
+              <a:rPr lang="en-US" sz="5400" dirty="0" smtClean="0">
+                <a:solidFill>
+                  <a:srgbClr val="0000FF"/>
+                </a:solidFill>
+              </a:rPr>
+              <a:t>)</a:t>
+            </a:r>
+          </a:p>
+          <a:p>
+            <a:r>
+              <a:rPr lang="en-US" sz="4800" dirty="0" smtClean="0">
+                <a:solidFill>
+                  <a:srgbClr val="000000"/>
+                </a:solidFill>
+              </a:rPr>
+              <a:t>for all </a:t>
+            </a:r>
+            <a:r>
+              <a:rPr lang="en-US" sz="4800" dirty="0">
+                <a:solidFill>
+                  <a:srgbClr val="0000FF"/>
+                </a:solidFill>
+              </a:rPr>
+              <a:t>a </a:t>
+            </a:r>
+            <a:r>
+              <a:rPr lang="en-US" sz="4800" dirty="0" smtClean="0">
+                <a:solidFill>
+                  <a:srgbClr val="0000FF"/>
+                </a:solidFill>
+                <a:latin typeface="Symbol" charset="2"/>
+                <a:cs typeface="Symbol" charset="2"/>
+              </a:rPr>
+              <a:t>∈</a:t>
+            </a:r>
+            <a:r>
+              <a:rPr lang="en-US" sz="4800" dirty="0" smtClean="0">
+                <a:solidFill>
+                  <a:srgbClr val="0000FF"/>
+                </a:solidFill>
+              </a:rPr>
+              <a:t>A </a:t>
+            </a:r>
+            <a:r>
+              <a:rPr lang="en-US" sz="4800" dirty="0" smtClean="0">
+                <a:solidFill>
+                  <a:srgbClr val="000000"/>
+                </a:solidFill>
+              </a:rPr>
+              <a:t>by </a:t>
+            </a:r>
+            <a:r>
+              <a:rPr lang="en-US" sz="4800" dirty="0" err="1" smtClean="0">
+                <a:solidFill>
+                  <a:srgbClr val="000000"/>
+                </a:solidFill>
+              </a:rPr>
+              <a:t>def</a:t>
+            </a:r>
+            <a:r>
+              <a:rPr lang="en-US" sz="4800" dirty="0" smtClean="0">
+                <a:solidFill>
+                  <a:srgbClr val="000000"/>
+                </a:solidFill>
+              </a:rPr>
+              <a:t> of</a:t>
+            </a:r>
+            <a:r>
+              <a:rPr lang="en-US" sz="4800" dirty="0" smtClean="0">
+                <a:solidFill>
+                  <a:srgbClr val="0000FF"/>
+                </a:solidFill>
+              </a:rPr>
               <a:t> D</a:t>
             </a:r>
             <a:r>
-              <a:rPr lang="en-US" sz="5400" dirty="0" smtClean="0">
+              <a:rPr lang="en-US" sz="4800" dirty="0" smtClean="0">
                 <a:solidFill>
                   <a:srgbClr val="000000"/>
                 </a:solidFill>
               </a:rPr>
               <a:t>.</a:t>
             </a:r>
-          </a:p>
-          <a:p>
-            <a:r>
-              <a:rPr lang="en-US" sz="5400" dirty="0" smtClean="0">
+            <a:endParaRPr lang="en-US" sz="4800" dirty="0" smtClean="0">
+              <a:solidFill>
+                <a:srgbClr val="000000"/>
+              </a:solidFill>
+            </a:endParaRPr>
+          </a:p>
+        </p:txBody>
+      </p:sp>
+      <p:sp>
+        <p:nvSpPr>
+          <p:cNvPr id="5" name="TextBox 4"/>
+          <p:cNvSpPr txBox="1"/>
+          <p:nvPr/>
+        </p:nvSpPr>
+        <p:spPr>
+          <a:xfrm>
+            <a:off x="270669" y="1516845"/>
+            <a:ext cx="8087570" cy="769441"/>
+          </a:xfrm>
+          <a:prstGeom prst="rect">
+            <a:avLst/>
+          </a:prstGeom>
+          <a:noFill/>
+        </p:spPr>
+        <p:txBody>
+          <a:bodyPr wrap="none" rtlCol="0">
+            <a:spAutoFit/>
+          </a:bodyPr>
+          <a:lstStyle/>
+          <a:p>
+            <a:r>
+              <a:rPr lang="en-US" sz="4400" dirty="0" smtClean="0">
+                <a:latin typeface="Comic Sans MS"/>
+                <a:cs typeface="Comic Sans MS"/>
+              </a:rPr>
+              <a:t>Pf: say have fcn  </a:t>
+            </a:r>
+            <a:r>
+              <a:rPr lang="en-US" sz="4400" dirty="0" smtClean="0">
                 <a:solidFill>
                   <a:srgbClr val="0000FF"/>
                 </a:solidFill>
-              </a:rPr>
-              <a:t>f</a:t>
-            </a:r>
-            <a:r>
-              <a:rPr lang="en-US" sz="5400" dirty="0" smtClean="0"/>
-              <a:t> is not a surjection.</a:t>
-            </a:r>
-          </a:p>
-          <a:p>
-            <a:r>
-              <a:rPr lang="en-US" sz="5400" dirty="0" smtClean="0">
-                <a:solidFill>
-                  <a:srgbClr val="008000"/>
-                </a:solidFill>
-              </a:rPr>
-              <a:t>QED</a:t>
-            </a:r>
-            <a:endParaRPr lang="en-US" sz="5400" dirty="0">
-              <a:solidFill>
-                <a:srgbClr val="008000"/>
-              </a:solidFill>
+                <a:latin typeface="Comic Sans MS"/>
+                <a:cs typeface="Comic Sans MS"/>
+              </a:rPr>
+              <a:t>f:A→pow(A)</a:t>
+            </a:r>
+            <a:r>
+              <a:rPr lang="en-US" sz="4400" dirty="0" smtClean="0">
+                <a:latin typeface="Comic Sans MS"/>
+                <a:cs typeface="Comic Sans MS"/>
+              </a:rPr>
+              <a:t>.  </a:t>
+            </a:r>
+          </a:p>
+        </p:txBody>
+      </p:sp>
+      <p:sp>
+        <p:nvSpPr>
+          <p:cNvPr id="4" name="TextBox 3"/>
+          <p:cNvSpPr txBox="1"/>
+          <p:nvPr/>
+        </p:nvSpPr>
+        <p:spPr>
+          <a:xfrm>
+            <a:off x="87246" y="4171899"/>
+            <a:ext cx="8957388" cy="1646605"/>
+          </a:xfrm>
+          <a:prstGeom prst="rect">
+            <a:avLst/>
+          </a:prstGeom>
+          <a:noFill/>
+        </p:spPr>
+        <p:txBody>
+          <a:bodyPr wrap="square" rtlCol="0">
+            <a:spAutoFit/>
+          </a:bodyPr>
+          <a:lstStyle/>
+          <a:p>
+            <a:pPr marL="342900" lvl="0" indent="-342900">
+              <a:spcBef>
+                <a:spcPct val="20000"/>
+              </a:spcBef>
+              <a:spcAft>
+                <a:spcPts val="600"/>
+              </a:spcAft>
+            </a:pPr>
+            <a:r>
+              <a:rPr lang="en-US" sz="4800" kern="0" dirty="0" smtClean="0">
+                <a:solidFill>
+                  <a:srgbClr val="000000"/>
+                </a:solidFill>
+                <a:latin typeface="Comic Sans MS" pitchFamily="66" charset="0"/>
+                <a:cs typeface="Comic Sans MS"/>
+              </a:rPr>
+              <a:t>Suppose </a:t>
+            </a:r>
+            <a:r>
+              <a:rPr lang="en-US" sz="4800" kern="0" dirty="0" smtClean="0">
+                <a:solidFill>
+                  <a:srgbClr val="0000FF"/>
+                </a:solidFill>
+                <a:latin typeface="Comic Sans MS" pitchFamily="66" charset="0"/>
+                <a:cs typeface="Comic Sans MS"/>
+              </a:rPr>
+              <a:t>D </a:t>
+            </a:r>
+            <a:r>
+              <a:rPr lang="en-US" sz="4800" kern="0" dirty="0">
+                <a:solidFill>
+                  <a:srgbClr val="0000FF"/>
+                </a:solidFill>
+                <a:latin typeface="Symbol" charset="2"/>
+                <a:cs typeface="Symbol" charset="2"/>
+              </a:rPr>
+              <a:t>∈</a:t>
+            </a:r>
+            <a:r>
+              <a:rPr lang="en-US" sz="4800" kern="0" dirty="0">
+                <a:solidFill>
+                  <a:srgbClr val="0000FF"/>
+                </a:solidFill>
+                <a:latin typeface="Comic Sans MS"/>
+                <a:cs typeface="Comic Sans MS"/>
+              </a:rPr>
+              <a:t> range(f</a:t>
+            </a:r>
+            <a:r>
+              <a:rPr lang="en-US" sz="4800" kern="0" dirty="0" smtClean="0">
+                <a:solidFill>
+                  <a:srgbClr val="0000FF"/>
+                </a:solidFill>
+                <a:latin typeface="Comic Sans MS"/>
+                <a:cs typeface="Comic Sans MS"/>
+              </a:rPr>
+              <a:t>)</a:t>
+            </a:r>
+            <a:r>
+              <a:rPr lang="en-US" sz="4800" kern="0" dirty="0" smtClean="0">
+                <a:solidFill>
+                  <a:srgbClr val="000000"/>
+                </a:solidFill>
+                <a:latin typeface="Comic Sans MS"/>
+                <a:cs typeface="Comic Sans MS"/>
+              </a:rPr>
+              <a:t>.  That is</a:t>
+            </a:r>
+          </a:p>
+          <a:p>
+            <a:pPr>
+              <a:spcAft>
+                <a:spcPts val="600"/>
+              </a:spcAft>
+            </a:pPr>
+            <a:r>
+              <a:rPr lang="en-US" sz="4800" dirty="0" smtClean="0">
+                <a:solidFill>
+                  <a:srgbClr val="0000FF"/>
+                </a:solidFill>
+                <a:latin typeface="Comic Sans MS"/>
+              </a:rPr>
+              <a:t>    D</a:t>
+            </a:r>
+            <a:r>
+              <a:rPr lang="en-US" sz="4800" dirty="0" smtClean="0">
+                <a:solidFill>
+                  <a:srgbClr val="000000"/>
+                </a:solidFill>
+                <a:latin typeface="Comic Sans MS"/>
+              </a:rPr>
+              <a:t> </a:t>
+            </a:r>
+            <a:r>
+              <a:rPr lang="en-US" sz="4800" dirty="0">
+                <a:solidFill>
+                  <a:srgbClr val="000000"/>
+                </a:solidFill>
+                <a:latin typeface="Comic Sans MS"/>
+              </a:rPr>
+              <a:t>= </a:t>
+            </a:r>
+            <a:r>
+              <a:rPr lang="en-US" sz="4800" dirty="0">
+                <a:solidFill>
+                  <a:srgbClr val="0000FF"/>
+                </a:solidFill>
+                <a:latin typeface="Comic Sans MS"/>
+              </a:rPr>
+              <a:t>f(a</a:t>
+            </a:r>
+            <a:r>
+              <a:rPr lang="en-US" sz="4800" baseline="-25000" dirty="0">
+                <a:solidFill>
+                  <a:srgbClr val="F609BB"/>
+                </a:solidFill>
+                <a:latin typeface="Comic Sans MS"/>
+              </a:rPr>
+              <a:t>d</a:t>
+            </a:r>
+            <a:r>
+              <a:rPr lang="en-US" sz="4800" dirty="0">
+                <a:solidFill>
+                  <a:srgbClr val="0000FF"/>
+                </a:solidFill>
+                <a:latin typeface="Comic Sans MS"/>
+              </a:rPr>
+              <a:t>) </a:t>
+            </a:r>
+            <a:r>
+              <a:rPr lang="en-US" sz="4800" dirty="0">
+                <a:latin typeface="Comic Sans MS"/>
+              </a:rPr>
+              <a:t>for </a:t>
+            </a:r>
+            <a:r>
+              <a:rPr lang="en-US" sz="4800" dirty="0" smtClean="0">
+                <a:latin typeface="Comic Sans MS"/>
+              </a:rPr>
+              <a:t>some</a:t>
+            </a:r>
+            <a:r>
+              <a:rPr lang="en-US" sz="4800" dirty="0" smtClean="0">
+                <a:solidFill>
+                  <a:srgbClr val="0000FF"/>
+                </a:solidFill>
+                <a:latin typeface="Comic Sans MS"/>
+              </a:rPr>
+              <a:t> </a:t>
+            </a:r>
+            <a:r>
+              <a:rPr lang="en-US" sz="4800" dirty="0">
+                <a:solidFill>
+                  <a:srgbClr val="0000FF"/>
+                </a:solidFill>
+                <a:latin typeface="Comic Sans MS"/>
+              </a:rPr>
+              <a:t>a</a:t>
+            </a:r>
+            <a:r>
+              <a:rPr lang="en-US" sz="4800" baseline="-25000" dirty="0">
+                <a:solidFill>
+                  <a:srgbClr val="F609BB"/>
+                </a:solidFill>
+                <a:latin typeface="Comic Sans MS"/>
+              </a:rPr>
+              <a:t>d </a:t>
+            </a:r>
+            <a:r>
+              <a:rPr lang="en-US" sz="4800" dirty="0">
+                <a:solidFill>
+                  <a:srgbClr val="0000FF"/>
+                </a:solidFill>
+                <a:latin typeface="Symbol" charset="2"/>
+                <a:cs typeface="Symbol" charset="2"/>
+              </a:rPr>
+              <a:t>∈</a:t>
+            </a:r>
+            <a:r>
+              <a:rPr lang="en-US" sz="4800" dirty="0">
+                <a:solidFill>
+                  <a:srgbClr val="0000FF"/>
+                </a:solidFill>
+                <a:latin typeface="Comic Sans MS"/>
+              </a:rPr>
+              <a:t>A</a:t>
+            </a:r>
+            <a:endParaRPr lang="en-US" sz="4800" dirty="0" smtClean="0">
+              <a:latin typeface="Comic Sans MS"/>
+              <a:cs typeface="Comic Sans MS"/>
             </a:endParaRPr>
           </a:p>
         </p:txBody>
@@ -8432,21 +9127,642 @@
     </p:custDataLst>
     <p:extLst>
       <p:ext uri="{BB962C8B-B14F-4D97-AF65-F5344CB8AC3E}">
-        <p14:creationId xmlns:p14="http://schemas.microsoft.com/office/powerpoint/2010/main" val="3905913044"/>
+        <p14:creationId xmlns:p14="http://schemas.microsoft.com/office/powerpoint/2010/main" val="1346342430"/>
       </p:ext>
     </p:extLst>
   </p:cSld>
   <p:clrMapOvr>
     <a:masterClrMapping/>
   </p:clrMapOvr>
-  <mc:AlternateContent xmlns:mc="http://schemas.openxmlformats.org/markup-compatibility/2006" xmlns:p14="http://schemas.microsoft.com/office/powerpoint/2010/main">
-    <mc:Choice Requires="p14">
-      <p:transition spd="slow" p14:dur="1050" advTm="19678">
+  <mc:AlternateContent xmlns:mc="http://schemas.openxmlformats.org/markup-compatibility/2006">
+    <mc:Choice xmlns:p14="http://schemas.microsoft.com/office/powerpoint/2010/main" Requires="p14">
+      <p:transition spd="med" p14:dur="650">
         <p:fade/>
       </p:transition>
     </mc:Choice>
-    <mc:Fallback xmlns="">
-      <p:transition xmlns:p14="http://schemas.microsoft.com/office/powerpoint/2010/main" spd="slow" advTm="19678">
+    <mc:Fallback>
+      <p:transition xmlns:p14="http://schemas.microsoft.com/office/powerpoint/2010/main" spd="med">
+        <p:fade/>
+      </p:transition>
+    </mc:Fallback>
+  </mc:AlternateContent>
+  <p:timing>
+    <p:tnLst>
+      <p:par>
+        <p:cTn xmlns:p14="http://schemas.microsoft.com/office/powerpoint/2010/main" id="1" dur="indefinite" restart="never" nodeType="tmRoot">
+          <p:childTnLst>
+            <p:seq concurrent="1" nextAc="seek">
+              <p:cTn id="2" dur="indefinite" nodeType="mainSeq">
+                <p:childTnLst>
+                  <p:par>
+                    <p:cTn id="3" fill="hold">
+                      <p:stCondLst>
+                        <p:cond delay="indefinite"/>
+                      </p:stCondLst>
+                      <p:childTnLst>
+                        <p:par>
+                          <p:cTn id="4" fill="hold">
+                            <p:stCondLst>
+                              <p:cond delay="0"/>
+                            </p:stCondLst>
+                            <p:childTnLst>
+                              <p:par>
+                                <p:cTn id="5" presetID="9" presetClass="entr" presetSubtype="0" fill="hold" grpId="0" nodeType="clickEffect">
+                                  <p:stCondLst>
+                                    <p:cond delay="0"/>
+                                  </p:stCondLst>
+                                  <p:childTnLst>
+                                    <p:set>
+                                      <p:cBhvr>
+                                        <p:cTn id="6" dur="1" fill="hold">
+                                          <p:stCondLst>
+                                            <p:cond delay="0"/>
+                                          </p:stCondLst>
+                                        </p:cTn>
+                                        <p:tgtEl>
+                                          <p:spTgt spid="4">
+                                            <p:txEl>
+                                              <p:pRg st="0" end="0"/>
+                                            </p:txEl>
+                                          </p:spTgt>
+                                        </p:tgtEl>
+                                        <p:attrNameLst>
+                                          <p:attrName>style.visibility</p:attrName>
+                                        </p:attrNameLst>
+                                      </p:cBhvr>
+                                      <p:to>
+                                        <p:strVal val="visible"/>
+                                      </p:to>
+                                    </p:set>
+                                    <p:animEffect transition="in" filter="dissolve">
+                                      <p:cBhvr>
+                                        <p:cTn id="7" dur="500"/>
+                                        <p:tgtEl>
+                                          <p:spTgt spid="4">
+                                            <p:txEl>
+                                              <p:pRg st="0" end="0"/>
+                                            </p:txEl>
+                                          </p:spTgt>
+                                        </p:tgtEl>
+                                      </p:cBhvr>
+                                    </p:animEffect>
+                                  </p:childTnLst>
+                                </p:cTn>
+                              </p:par>
+                            </p:childTnLst>
+                          </p:cTn>
+                        </p:par>
+                      </p:childTnLst>
+                    </p:cTn>
+                  </p:par>
+                  <p:par>
+                    <p:cTn id="8" fill="hold">
+                      <p:stCondLst>
+                        <p:cond delay="indefinite"/>
+                      </p:stCondLst>
+                      <p:childTnLst>
+                        <p:par>
+                          <p:cTn id="9" fill="hold">
+                            <p:stCondLst>
+                              <p:cond delay="0"/>
+                            </p:stCondLst>
+                            <p:childTnLst>
+                              <p:par>
+                                <p:cTn id="10" presetID="22" presetClass="entr" presetSubtype="8" fill="hold" grpId="0" nodeType="clickEffect">
+                                  <p:stCondLst>
+                                    <p:cond delay="0"/>
+                                  </p:stCondLst>
+                                  <p:childTnLst>
+                                    <p:set>
+                                      <p:cBhvr>
+                                        <p:cTn id="11" dur="1" fill="hold">
+                                          <p:stCondLst>
+                                            <p:cond delay="0"/>
+                                          </p:stCondLst>
+                                        </p:cTn>
+                                        <p:tgtEl>
+                                          <p:spTgt spid="4">
+                                            <p:txEl>
+                                              <p:pRg st="1" end="1"/>
+                                            </p:txEl>
+                                          </p:spTgt>
+                                        </p:tgtEl>
+                                        <p:attrNameLst>
+                                          <p:attrName>style.visibility</p:attrName>
+                                        </p:attrNameLst>
+                                      </p:cBhvr>
+                                      <p:to>
+                                        <p:strVal val="visible"/>
+                                      </p:to>
+                                    </p:set>
+                                    <p:animEffect transition="in" filter="wipe(left)">
+                                      <p:cBhvr>
+                                        <p:cTn id="12" dur="1000"/>
+                                        <p:tgtEl>
+                                          <p:spTgt spid="4">
+                                            <p:txEl>
+                                              <p:pRg st="1" end="1"/>
+                                            </p:txEl>
+                                          </p:spTgt>
+                                        </p:tgtEl>
+                                      </p:cBhvr>
+                                    </p:animEffect>
+                                  </p:childTnLst>
+                                </p:cTn>
+                              </p:par>
+                            </p:childTnLst>
+                          </p:cTn>
+                        </p:par>
+                      </p:childTnLst>
+                    </p:cTn>
+                  </p:par>
+                </p:childTnLst>
+              </p:cTn>
+              <p:prevCondLst>
+                <p:cond evt="onPrev" delay="0">
+                  <p:tgtEl>
+                    <p:sldTgt/>
+                  </p:tgtEl>
+                </p:cond>
+              </p:prevCondLst>
+              <p:nextCondLst>
+                <p:cond evt="onNext" delay="0">
+                  <p:tgtEl>
+                    <p:sldTgt/>
+                  </p:tgtEl>
+                </p:cond>
+              </p:nextCondLst>
+            </p:seq>
+          </p:childTnLst>
+        </p:cTn>
+      </p:par>
+    </p:tnLst>
+    <p:bldLst>
+      <p:bldP spid="4" grpId="0" build="p"/>
+    </p:bldLst>
+  </p:timing>
+</p:sld>
+</file>
+
+<file path=ppt/slides/slide13.xml><?xml version="1.0" encoding="utf-8"?>
+<p:sld xmlns:a="http://schemas.openxmlformats.org/drawingml/2006/main" xmlns:r="http://schemas.openxmlformats.org/officeDocument/2006/relationships" xmlns:p="http://schemas.openxmlformats.org/presentationml/2006/main">
+  <p:cSld>
+    <p:spTree>
+      <p:nvGrpSpPr>
+        <p:cNvPr id="1" name=""/>
+        <p:cNvGrpSpPr/>
+        <p:nvPr/>
+      </p:nvGrpSpPr>
+      <p:grpSpPr>
+        <a:xfrm>
+          <a:off x="0" y="0"/>
+          <a:ext cx="0" cy="0"/>
+          <a:chOff x="0" y="0"/>
+          <a:chExt cx="0" cy="0"/>
+        </a:xfrm>
+      </p:grpSpPr>
+      <p:sp>
+        <p:nvSpPr>
+          <p:cNvPr id="2" name="Title 1"/>
+          <p:cNvSpPr>
+            <a:spLocks noGrp="1"/>
+          </p:cNvSpPr>
+          <p:nvPr>
+            <p:ph type="title"/>
+          </p:nvPr>
+        </p:nvSpPr>
+        <p:spPr>
+          <a:xfrm>
+            <a:off x="1748862" y="355344"/>
+            <a:ext cx="5649452" cy="980204"/>
+          </a:xfrm>
+        </p:spPr>
+        <p:txBody>
+          <a:bodyPr/>
+          <a:lstStyle/>
+          <a:p>
+            <a:r>
+              <a:rPr lang="en-US" b="0" dirty="0" smtClean="0">
+                <a:solidFill>
+                  <a:srgbClr val="FF0000"/>
+                </a:solidFill>
+              </a:rPr>
+              <a:t>NOT</a:t>
+            </a:r>
+            <a:r>
+              <a:rPr lang="en-US" sz="4400" b="0" dirty="0" smtClean="0">
+                <a:solidFill>
+                  <a:srgbClr val="0000FF"/>
+                </a:solidFill>
+              </a:rPr>
+              <a:t>[</a:t>
+            </a:r>
+            <a:r>
+              <a:rPr lang="en-US" sz="4000" b="0" dirty="0" smtClean="0">
+                <a:solidFill>
+                  <a:srgbClr val="0000FF"/>
+                </a:solidFill>
+              </a:rPr>
+              <a:t>A </a:t>
+            </a:r>
+            <a:r>
+              <a:rPr lang="en-US" sz="4000" b="0" dirty="0">
+                <a:solidFill>
+                  <a:srgbClr val="9933FF"/>
+                </a:solidFill>
+              </a:rPr>
+              <a:t>surj</a:t>
+            </a:r>
+            <a:r>
+              <a:rPr lang="en-US" sz="4000" b="0" dirty="0">
+                <a:solidFill>
+                  <a:srgbClr val="0000FF"/>
+                </a:solidFill>
+              </a:rPr>
+              <a:t> </a:t>
+            </a:r>
+            <a:r>
+              <a:rPr lang="en-US" sz="4000" b="0" dirty="0" smtClean="0">
+                <a:solidFill>
+                  <a:srgbClr val="0000FF"/>
+                </a:solidFill>
+              </a:rPr>
+              <a:t>Pow(A)</a:t>
+            </a:r>
+            <a:r>
+              <a:rPr lang="en-US" sz="4400" b="0" dirty="0" smtClean="0">
+                <a:solidFill>
+                  <a:srgbClr val="0000FF"/>
+                </a:solidFill>
+              </a:rPr>
+              <a:t>]</a:t>
+            </a:r>
+            <a:endParaRPr lang="en-US" sz="4000" b="0" dirty="0">
+              <a:solidFill>
+                <a:srgbClr val="0000FF"/>
+              </a:solidFill>
+            </a:endParaRPr>
+          </a:p>
+        </p:txBody>
+      </p:sp>
+      <p:sp>
+        <p:nvSpPr>
+          <p:cNvPr id="3" name="Content Placeholder 2"/>
+          <p:cNvSpPr>
+            <a:spLocks noGrp="1"/>
+          </p:cNvSpPr>
+          <p:nvPr>
+            <p:ph idx="1"/>
+          </p:nvPr>
+        </p:nvSpPr>
+        <p:spPr>
+          <a:xfrm>
+            <a:off x="185741" y="2299778"/>
+            <a:ext cx="8849199" cy="2925827"/>
+          </a:xfrm>
+        </p:spPr>
+        <p:txBody>
+          <a:bodyPr/>
+          <a:lstStyle/>
+          <a:p>
+            <a:pPr algn="ctr"/>
+            <a:r>
+              <a:rPr lang="en-US" sz="5400" dirty="0" smtClean="0">
+                <a:solidFill>
+                  <a:srgbClr val="0000FF"/>
+                </a:solidFill>
+              </a:rPr>
+              <a:t>  a </a:t>
+            </a:r>
+            <a:r>
+              <a:rPr lang="en-US" sz="5400" dirty="0" smtClean="0">
+                <a:solidFill>
+                  <a:srgbClr val="0000FF"/>
+                </a:solidFill>
+                <a:latin typeface="Symbol" charset="2"/>
+                <a:cs typeface="Symbol" charset="2"/>
+              </a:rPr>
+              <a:t>∈</a:t>
+            </a:r>
+            <a:r>
+              <a:rPr lang="en-US" sz="5400" dirty="0">
+                <a:solidFill>
+                  <a:srgbClr val="0000FF"/>
+                </a:solidFill>
+                <a:latin typeface="Comic Sans MS"/>
+              </a:rPr>
+              <a:t>f(a</a:t>
+            </a:r>
+            <a:r>
+              <a:rPr lang="en-US" sz="5400" baseline="-25000" dirty="0">
+                <a:solidFill>
+                  <a:srgbClr val="F609BB"/>
+                </a:solidFill>
+                <a:latin typeface="Comic Sans MS"/>
+              </a:rPr>
+              <a:t>d</a:t>
+            </a:r>
+            <a:r>
+              <a:rPr lang="en-US" sz="5400" dirty="0" smtClean="0">
+                <a:solidFill>
+                  <a:srgbClr val="0000FF"/>
+                </a:solidFill>
+                <a:latin typeface="Comic Sans MS"/>
+              </a:rPr>
+              <a:t>)</a:t>
+            </a:r>
+            <a:r>
+              <a:rPr lang="en-US" sz="5400" dirty="0" smtClean="0">
+                <a:solidFill>
+                  <a:srgbClr val="0000FF"/>
+                </a:solidFill>
+              </a:rPr>
+              <a:t>   </a:t>
+            </a:r>
+            <a:r>
+              <a:rPr lang="en-US" sz="4400" dirty="0" smtClean="0">
+                <a:solidFill>
+                  <a:srgbClr val="000000"/>
+                </a:solidFill>
+              </a:rPr>
+              <a:t>IFF</a:t>
+            </a:r>
+            <a:r>
+              <a:rPr lang="en-US" sz="5400" dirty="0" smtClean="0">
+                <a:solidFill>
+                  <a:srgbClr val="000000"/>
+                </a:solidFill>
+              </a:rPr>
+              <a:t>  </a:t>
+            </a:r>
+            <a:r>
+              <a:rPr lang="en-US" sz="5400" dirty="0" smtClean="0">
+                <a:solidFill>
+                  <a:srgbClr val="0000FF"/>
+                </a:solidFill>
+              </a:rPr>
+              <a:t> </a:t>
+            </a:r>
+            <a:r>
+              <a:rPr lang="en-US" sz="5400" dirty="0" smtClean="0">
+                <a:solidFill>
+                  <a:srgbClr val="0000FF"/>
+                </a:solidFill>
+              </a:rPr>
+              <a:t>a </a:t>
+            </a:r>
+            <a:r>
+              <a:rPr lang="en-US" sz="5400" dirty="0" smtClean="0">
+                <a:solidFill>
+                  <a:srgbClr val="0000FF"/>
+                </a:solidFill>
+                <a:latin typeface="Symbol" charset="2"/>
+                <a:cs typeface="Symbol" charset="2"/>
+                <a:sym typeface="Euclid Symbol"/>
+              </a:rPr>
+              <a:t>∉</a:t>
+            </a:r>
+            <a:r>
+              <a:rPr lang="en-US" sz="5400" dirty="0" smtClean="0">
+                <a:solidFill>
+                  <a:srgbClr val="0000FF"/>
+                </a:solidFill>
+              </a:rPr>
+              <a:t> f(a</a:t>
+            </a:r>
+            <a:r>
+              <a:rPr lang="en-US" sz="5400" dirty="0" smtClean="0">
+                <a:solidFill>
+                  <a:srgbClr val="0000FF"/>
+                </a:solidFill>
+              </a:rPr>
+              <a:t>)</a:t>
+            </a:r>
+          </a:p>
+          <a:p>
+            <a:r>
+              <a:rPr lang="en-US" sz="4800" dirty="0" smtClean="0">
+                <a:solidFill>
+                  <a:srgbClr val="0000FF"/>
+                </a:solidFill>
+              </a:rPr>
+              <a:t>for all </a:t>
+            </a:r>
+            <a:r>
+              <a:rPr lang="en-US" sz="4800" dirty="0">
+                <a:solidFill>
+                  <a:srgbClr val="0000FF"/>
+                </a:solidFill>
+              </a:rPr>
+              <a:t>a </a:t>
+            </a:r>
+            <a:r>
+              <a:rPr lang="en-US" sz="4800" dirty="0" smtClean="0">
+                <a:solidFill>
+                  <a:srgbClr val="0000FF"/>
+                </a:solidFill>
+                <a:latin typeface="Symbol" charset="2"/>
+                <a:cs typeface="Symbol" charset="2"/>
+              </a:rPr>
+              <a:t>∈</a:t>
+            </a:r>
+            <a:r>
+              <a:rPr lang="en-US" sz="4800" dirty="0" smtClean="0">
+                <a:solidFill>
+                  <a:srgbClr val="0000FF"/>
+                </a:solidFill>
+              </a:rPr>
+              <a:t>A </a:t>
+            </a:r>
+            <a:r>
+              <a:rPr lang="en-US" sz="4800" dirty="0" smtClean="0">
+                <a:solidFill>
+                  <a:srgbClr val="0000FF"/>
+                </a:solidFill>
+              </a:rPr>
+              <a:t>by </a:t>
+            </a:r>
+            <a:r>
+              <a:rPr lang="en-US" sz="4800" dirty="0" err="1" smtClean="0">
+                <a:solidFill>
+                  <a:srgbClr val="0000FF"/>
+                </a:solidFill>
+              </a:rPr>
+              <a:t>def</a:t>
+            </a:r>
+            <a:r>
+              <a:rPr lang="en-US" sz="4800" dirty="0" smtClean="0">
+                <a:solidFill>
+                  <a:srgbClr val="0000FF"/>
+                </a:solidFill>
+              </a:rPr>
+              <a:t> of </a:t>
+            </a:r>
+            <a:r>
+              <a:rPr lang="en-US" sz="4800" dirty="0" smtClean="0">
+                <a:solidFill>
+                  <a:srgbClr val="0000FF"/>
+                </a:solidFill>
+              </a:rPr>
+              <a:t>D</a:t>
+            </a:r>
+            <a:r>
+              <a:rPr lang="en-US" sz="4800" dirty="0" smtClean="0">
+                <a:solidFill>
+                  <a:srgbClr val="0000FF"/>
+                </a:solidFill>
+              </a:rPr>
+              <a:t>, </a:t>
+            </a:r>
+            <a:r>
+              <a:rPr lang="en-US" sz="4800" dirty="0" smtClean="0">
+                <a:solidFill>
+                  <a:srgbClr val="0000FF"/>
+                </a:solidFill>
+                <a:latin typeface="Comic Sans MS"/>
+              </a:rPr>
+              <a:t>a</a:t>
+            </a:r>
+            <a:r>
+              <a:rPr lang="en-US" sz="4800" baseline="-25000" dirty="0" smtClean="0">
+                <a:solidFill>
+                  <a:srgbClr val="F609BB"/>
+                </a:solidFill>
+                <a:latin typeface="Comic Sans MS"/>
+              </a:rPr>
+              <a:t>d </a:t>
+            </a:r>
+            <a:r>
+              <a:rPr lang="en-US" sz="4800" dirty="0" smtClean="0">
+                <a:latin typeface="Comic Sans MS"/>
+              </a:rPr>
+              <a:t>.</a:t>
+            </a:r>
+          </a:p>
+          <a:p>
+            <a:r>
+              <a:rPr lang="en-US" sz="5400" dirty="0">
+                <a:latin typeface="Comic Sans MS"/>
+              </a:rPr>
+              <a:t>Let </a:t>
+            </a:r>
+            <a:r>
+              <a:rPr lang="en-US" sz="5400" dirty="0">
+                <a:solidFill>
+                  <a:srgbClr val="0000FF"/>
+                </a:solidFill>
+                <a:latin typeface="Comic Sans MS"/>
+              </a:rPr>
+              <a:t>a</a:t>
+            </a:r>
+            <a:r>
+              <a:rPr lang="en-US" sz="5400" dirty="0">
+                <a:latin typeface="Comic Sans MS"/>
+              </a:rPr>
+              <a:t> </a:t>
+            </a:r>
+            <a:r>
+              <a:rPr lang="en-US" sz="5400" dirty="0" smtClean="0">
+                <a:latin typeface="Comic Sans MS"/>
+              </a:rPr>
+              <a:t>be </a:t>
+            </a:r>
+            <a:r>
+              <a:rPr lang="en-US" sz="5400" dirty="0" smtClean="0">
+                <a:solidFill>
+                  <a:srgbClr val="0000FF"/>
+                </a:solidFill>
+                <a:latin typeface="Comic Sans MS"/>
+              </a:rPr>
+              <a:t>a</a:t>
+            </a:r>
+            <a:r>
+              <a:rPr lang="en-US" sz="5400" baseline="-25000" dirty="0" smtClean="0">
+                <a:solidFill>
+                  <a:srgbClr val="F609BB"/>
+                </a:solidFill>
+                <a:latin typeface="Comic Sans MS"/>
+              </a:rPr>
+              <a:t>d</a:t>
+            </a:r>
+            <a:endParaRPr lang="en-US" sz="5400" dirty="0" smtClean="0">
+              <a:solidFill>
+                <a:srgbClr val="000000"/>
+              </a:solidFill>
+            </a:endParaRPr>
+          </a:p>
+        </p:txBody>
+      </p:sp>
+      <p:sp>
+        <p:nvSpPr>
+          <p:cNvPr id="5" name="TextBox 4"/>
+          <p:cNvSpPr txBox="1"/>
+          <p:nvPr/>
+        </p:nvSpPr>
+        <p:spPr>
+          <a:xfrm>
+            <a:off x="270669" y="1516845"/>
+            <a:ext cx="8087570" cy="769441"/>
+          </a:xfrm>
+          <a:prstGeom prst="rect">
+            <a:avLst/>
+          </a:prstGeom>
+          <a:noFill/>
+        </p:spPr>
+        <p:txBody>
+          <a:bodyPr wrap="none" rtlCol="0">
+            <a:spAutoFit/>
+          </a:bodyPr>
+          <a:lstStyle/>
+          <a:p>
+            <a:r>
+              <a:rPr lang="en-US" sz="4400" dirty="0" smtClean="0">
+                <a:latin typeface="Comic Sans MS"/>
+                <a:cs typeface="Comic Sans MS"/>
+              </a:rPr>
+              <a:t>Pf: say have fcn  </a:t>
+            </a:r>
+            <a:r>
+              <a:rPr lang="en-US" sz="4400" dirty="0" smtClean="0">
+                <a:solidFill>
+                  <a:srgbClr val="0000FF"/>
+                </a:solidFill>
+                <a:latin typeface="Comic Sans MS"/>
+                <a:cs typeface="Comic Sans MS"/>
+              </a:rPr>
+              <a:t>f:A→pow(A)</a:t>
+            </a:r>
+            <a:r>
+              <a:rPr lang="en-US" sz="4400" dirty="0" smtClean="0">
+                <a:latin typeface="Comic Sans MS"/>
+                <a:cs typeface="Comic Sans MS"/>
+              </a:rPr>
+              <a:t>.  </a:t>
+            </a:r>
+          </a:p>
+        </p:txBody>
+      </p:sp>
+    </p:spTree>
+    <p:custDataLst>
+      <p:tags r:id="rId1"/>
+    </p:custDataLst>
+    <p:extLst>
+      <p:ext uri="{BB962C8B-B14F-4D97-AF65-F5344CB8AC3E}">
+        <p14:creationId xmlns:p14="http://schemas.microsoft.com/office/powerpoint/2010/main" val="3105002093"/>
+      </p:ext>
+    </p:extLst>
+  </p:cSld>
+  <p:clrMapOvr>
+    <a:masterClrMapping/>
+  </p:clrMapOvr>
+  <mc:AlternateContent xmlns:mc="http://schemas.openxmlformats.org/markup-compatibility/2006">
+    <mc:Choice xmlns:p14="http://schemas.microsoft.com/office/powerpoint/2010/main" Requires="p14">
+      <p:transition spd="med" p14:dur="650">
+        <p:fade/>
+      </p:transition>
+    </mc:Choice>
+    <mc:Fallback>
+      <p:transition xmlns:p14="http://schemas.microsoft.com/office/powerpoint/2010/main" spd="med">
         <p:fade/>
       </p:transition>
     </mc:Fallback>
@@ -8487,7 +9803,7 @@
                                         <p:tgtEl>
                                           <p:spTgt spid="3">
                                             <p:txEl>
-                                              <p:pRg st="0" end="0"/>
+                                              <p:pRg st="2" end="2"/>
                                             </p:txEl>
                                           </p:spTgt>
                                         </p:tgtEl>
@@ -8505,7 +9821,1636 @@
                                         <p:tgtEl>
                                           <p:spTgt spid="3">
                                             <p:txEl>
-                                              <p:pRg st="0" end="0"/>
+                                              <p:pRg st="2" end="2"/>
+                                            </p:txEl>
+                                          </p:spTgt>
+                                        </p:tgtEl>
+                                      </p:cBhvr>
+                                    </p:animEffect>
+                                  </p:childTnLst>
+                                </p:cTn>
+                              </p:par>
+                            </p:childTnLst>
+                          </p:cTn>
+                        </p:par>
+                      </p:childTnLst>
+                    </p:cTn>
+                  </p:par>
+                </p:childTnLst>
+              </p:cTn>
+              <p:prevCondLst>
+                <p:cond evt="onPrev" delay="0">
+                  <p:tgtEl>
+                    <p:sldTgt/>
+                  </p:tgtEl>
+                </p:cond>
+              </p:prevCondLst>
+              <p:nextCondLst>
+                <p:cond evt="onNext" delay="0">
+                  <p:tgtEl>
+                    <p:sldTgt/>
+                  </p:tgtEl>
+                </p:cond>
+              </p:nextCondLst>
+            </p:seq>
+          </p:childTnLst>
+        </p:cTn>
+      </p:par>
+    </p:tnLst>
+    <p:bldLst>
+      <p:bldP spid="3" grpId="0" uiExpand="1" build="p"/>
+    </p:bldLst>
+  </p:timing>
+</p:sld>
+</file>
+
+<file path=ppt/slides/slide14.xml><?xml version="1.0" encoding="utf-8"?>
+<p:sld xmlns:a="http://schemas.openxmlformats.org/drawingml/2006/main" xmlns:r="http://schemas.openxmlformats.org/officeDocument/2006/relationships" xmlns:p="http://schemas.openxmlformats.org/presentationml/2006/main">
+  <p:cSld>
+    <p:spTree>
+      <p:nvGrpSpPr>
+        <p:cNvPr id="1" name=""/>
+        <p:cNvGrpSpPr/>
+        <p:nvPr/>
+      </p:nvGrpSpPr>
+      <p:grpSpPr>
+        <a:xfrm>
+          <a:off x="0" y="0"/>
+          <a:ext cx="0" cy="0"/>
+          <a:chOff x="0" y="0"/>
+          <a:chExt cx="0" cy="0"/>
+        </a:xfrm>
+      </p:grpSpPr>
+      <p:sp>
+        <p:nvSpPr>
+          <p:cNvPr id="2" name="Title 1"/>
+          <p:cNvSpPr>
+            <a:spLocks noGrp="1"/>
+          </p:cNvSpPr>
+          <p:nvPr>
+            <p:ph type="title"/>
+          </p:nvPr>
+        </p:nvSpPr>
+        <p:spPr>
+          <a:xfrm>
+            <a:off x="1748862" y="355344"/>
+            <a:ext cx="5649452" cy="980204"/>
+          </a:xfrm>
+        </p:spPr>
+        <p:txBody>
+          <a:bodyPr/>
+          <a:lstStyle/>
+          <a:p>
+            <a:r>
+              <a:rPr lang="en-US" b="0" dirty="0" smtClean="0">
+                <a:solidFill>
+                  <a:srgbClr val="FF0000"/>
+                </a:solidFill>
+              </a:rPr>
+              <a:t>NOT</a:t>
+            </a:r>
+            <a:r>
+              <a:rPr lang="en-US" sz="4400" b="0" dirty="0" smtClean="0">
+                <a:solidFill>
+                  <a:srgbClr val="0000FF"/>
+                </a:solidFill>
+              </a:rPr>
+              <a:t>[</a:t>
+            </a:r>
+            <a:r>
+              <a:rPr lang="en-US" sz="4000" b="0" dirty="0" smtClean="0">
+                <a:solidFill>
+                  <a:srgbClr val="0000FF"/>
+                </a:solidFill>
+              </a:rPr>
+              <a:t>A </a:t>
+            </a:r>
+            <a:r>
+              <a:rPr lang="en-US" sz="4000" b="0" dirty="0">
+                <a:solidFill>
+                  <a:srgbClr val="9933FF"/>
+                </a:solidFill>
+              </a:rPr>
+              <a:t>surj</a:t>
+            </a:r>
+            <a:r>
+              <a:rPr lang="en-US" sz="4000" b="0" dirty="0">
+                <a:solidFill>
+                  <a:srgbClr val="0000FF"/>
+                </a:solidFill>
+              </a:rPr>
+              <a:t> </a:t>
+            </a:r>
+            <a:r>
+              <a:rPr lang="en-US" sz="4000" b="0" dirty="0" smtClean="0">
+                <a:solidFill>
+                  <a:srgbClr val="0000FF"/>
+                </a:solidFill>
+              </a:rPr>
+              <a:t>Pow(A)</a:t>
+            </a:r>
+            <a:r>
+              <a:rPr lang="en-US" sz="4400" b="0" dirty="0" smtClean="0">
+                <a:solidFill>
+                  <a:srgbClr val="0000FF"/>
+                </a:solidFill>
+              </a:rPr>
+              <a:t>]</a:t>
+            </a:r>
+            <a:endParaRPr lang="en-US" sz="4000" b="0" dirty="0">
+              <a:solidFill>
+                <a:srgbClr val="0000FF"/>
+              </a:solidFill>
+            </a:endParaRPr>
+          </a:p>
+        </p:txBody>
+      </p:sp>
+      <p:sp>
+        <p:nvSpPr>
+          <p:cNvPr id="3" name="Content Placeholder 2"/>
+          <p:cNvSpPr>
+            <a:spLocks noGrp="1"/>
+          </p:cNvSpPr>
+          <p:nvPr>
+            <p:ph idx="1"/>
+          </p:nvPr>
+        </p:nvSpPr>
+        <p:spPr>
+          <a:xfrm>
+            <a:off x="185741" y="2299778"/>
+            <a:ext cx="8849199" cy="2925827"/>
+          </a:xfrm>
+        </p:spPr>
+        <p:txBody>
+          <a:bodyPr/>
+          <a:lstStyle/>
+          <a:p>
+            <a:pPr algn="ctr"/>
+            <a:r>
+              <a:rPr lang="en-US" sz="5400" dirty="0" smtClean="0">
+                <a:solidFill>
+                  <a:srgbClr val="0000FF"/>
+                </a:solidFill>
+              </a:rPr>
+              <a:t>  </a:t>
+            </a:r>
+            <a:r>
+              <a:rPr lang="en-US" sz="5400" dirty="0">
+                <a:solidFill>
+                  <a:srgbClr val="0000FF"/>
+                </a:solidFill>
+                <a:latin typeface="Comic Sans MS"/>
+              </a:rPr>
+              <a:t>a</a:t>
+            </a:r>
+            <a:r>
+              <a:rPr lang="en-US" sz="5400" baseline="-25000" dirty="0">
+                <a:solidFill>
+                  <a:srgbClr val="F609BB"/>
+                </a:solidFill>
+                <a:latin typeface="Comic Sans MS"/>
+              </a:rPr>
+              <a:t>d</a:t>
+            </a:r>
+            <a:r>
+              <a:rPr lang="en-US" sz="5400" dirty="0" smtClean="0">
+                <a:solidFill>
+                  <a:srgbClr val="0000FF"/>
+                </a:solidFill>
+              </a:rPr>
+              <a:t> </a:t>
+            </a:r>
+            <a:r>
+              <a:rPr lang="en-US" sz="5400" dirty="0" smtClean="0">
+                <a:solidFill>
+                  <a:srgbClr val="0000FF"/>
+                </a:solidFill>
+                <a:latin typeface="Symbol" charset="2"/>
+                <a:cs typeface="Symbol" charset="2"/>
+              </a:rPr>
+              <a:t>∈</a:t>
+            </a:r>
+            <a:r>
+              <a:rPr lang="en-US" sz="5400" dirty="0">
+                <a:solidFill>
+                  <a:srgbClr val="0000FF"/>
+                </a:solidFill>
+                <a:latin typeface="Comic Sans MS"/>
+              </a:rPr>
+              <a:t>f(a</a:t>
+            </a:r>
+            <a:r>
+              <a:rPr lang="en-US" sz="5400" baseline="-25000" dirty="0">
+                <a:solidFill>
+                  <a:srgbClr val="F609BB"/>
+                </a:solidFill>
+                <a:latin typeface="Comic Sans MS"/>
+              </a:rPr>
+              <a:t>d</a:t>
+            </a:r>
+            <a:r>
+              <a:rPr lang="en-US" sz="5400" dirty="0" smtClean="0">
+                <a:solidFill>
+                  <a:srgbClr val="0000FF"/>
+                </a:solidFill>
+                <a:latin typeface="Comic Sans MS"/>
+              </a:rPr>
+              <a:t>)</a:t>
+            </a:r>
+            <a:r>
+              <a:rPr lang="en-US" sz="5400" dirty="0" smtClean="0">
+                <a:solidFill>
+                  <a:srgbClr val="0000FF"/>
+                </a:solidFill>
+              </a:rPr>
+              <a:t>   </a:t>
+            </a:r>
+            <a:r>
+              <a:rPr lang="en-US" sz="4400" dirty="0" smtClean="0">
+                <a:solidFill>
+                  <a:srgbClr val="000000"/>
+                </a:solidFill>
+              </a:rPr>
+              <a:t>IFF </a:t>
+            </a:r>
+            <a:r>
+              <a:rPr lang="en-US" sz="5400" dirty="0" smtClean="0">
+                <a:solidFill>
+                  <a:srgbClr val="0000FF"/>
+                </a:solidFill>
+              </a:rPr>
+              <a:t> </a:t>
+            </a:r>
+            <a:r>
+              <a:rPr lang="en-US" sz="5400" dirty="0">
+                <a:solidFill>
+                  <a:srgbClr val="0000FF"/>
+                </a:solidFill>
+                <a:latin typeface="Comic Sans MS"/>
+              </a:rPr>
+              <a:t>a</a:t>
+            </a:r>
+            <a:r>
+              <a:rPr lang="en-US" sz="5400" baseline="-25000" dirty="0">
+                <a:solidFill>
+                  <a:srgbClr val="F609BB"/>
+                </a:solidFill>
+                <a:latin typeface="Comic Sans MS"/>
+              </a:rPr>
+              <a:t>d</a:t>
+            </a:r>
+            <a:r>
+              <a:rPr lang="en-US" sz="5400" dirty="0" smtClean="0">
+                <a:solidFill>
+                  <a:srgbClr val="0000FF"/>
+                </a:solidFill>
+              </a:rPr>
+              <a:t> </a:t>
+            </a:r>
+            <a:r>
+              <a:rPr lang="en-US" sz="5400" dirty="0" smtClean="0">
+                <a:solidFill>
+                  <a:srgbClr val="0000FF"/>
+                </a:solidFill>
+                <a:latin typeface="Symbol" charset="2"/>
+                <a:cs typeface="Symbol" charset="2"/>
+                <a:sym typeface="Euclid Symbol"/>
+              </a:rPr>
+              <a:t>∉</a:t>
+            </a:r>
+            <a:r>
+              <a:rPr lang="en-US" sz="5400" dirty="0" smtClean="0">
+                <a:solidFill>
+                  <a:srgbClr val="0000FF"/>
+                </a:solidFill>
+              </a:rPr>
+              <a:t> f</a:t>
+            </a:r>
+            <a:r>
+              <a:rPr lang="en-US" sz="5400" dirty="0" smtClean="0">
+                <a:solidFill>
+                  <a:srgbClr val="0000FF"/>
+                </a:solidFill>
+              </a:rPr>
+              <a:t>(</a:t>
+            </a:r>
+            <a:r>
+              <a:rPr lang="en-US" sz="5400" dirty="0">
+                <a:solidFill>
+                  <a:srgbClr val="0000FF"/>
+                </a:solidFill>
+                <a:latin typeface="Comic Sans MS"/>
+              </a:rPr>
+              <a:t>a</a:t>
+            </a:r>
+            <a:r>
+              <a:rPr lang="en-US" sz="5400" baseline="-25000" dirty="0">
+                <a:solidFill>
+                  <a:srgbClr val="F609BB"/>
+                </a:solidFill>
+                <a:latin typeface="Comic Sans MS"/>
+              </a:rPr>
+              <a:t>d</a:t>
+            </a:r>
+            <a:r>
+              <a:rPr lang="en-US" sz="5400" dirty="0" smtClean="0">
+                <a:solidFill>
+                  <a:srgbClr val="0000FF"/>
+                </a:solidFill>
+              </a:rPr>
+              <a:t>)</a:t>
+            </a:r>
+          </a:p>
+          <a:p>
+            <a:r>
+              <a:rPr lang="en-US" sz="4800" dirty="0" smtClean="0">
+                <a:solidFill>
+                  <a:srgbClr val="000000"/>
+                </a:solidFill>
+              </a:rPr>
+              <a:t>for all </a:t>
+            </a:r>
+            <a:r>
+              <a:rPr lang="en-US" sz="4800" dirty="0">
+                <a:solidFill>
+                  <a:srgbClr val="0000FF"/>
+                </a:solidFill>
+              </a:rPr>
+              <a:t>a </a:t>
+            </a:r>
+            <a:r>
+              <a:rPr lang="en-US" sz="4800" dirty="0" smtClean="0">
+                <a:solidFill>
+                  <a:srgbClr val="0000FF"/>
+                </a:solidFill>
+                <a:latin typeface="Symbol" charset="2"/>
+                <a:cs typeface="Symbol" charset="2"/>
+              </a:rPr>
+              <a:t>∈</a:t>
+            </a:r>
+            <a:r>
+              <a:rPr lang="en-US" sz="4800" dirty="0" smtClean="0">
+                <a:solidFill>
+                  <a:srgbClr val="0000FF"/>
+                </a:solidFill>
+              </a:rPr>
+              <a:t>A </a:t>
+            </a:r>
+            <a:r>
+              <a:rPr lang="en-US" sz="4800" dirty="0" smtClean="0">
+                <a:solidFill>
+                  <a:srgbClr val="000000"/>
+                </a:solidFill>
+              </a:rPr>
+              <a:t>by </a:t>
+            </a:r>
+            <a:r>
+              <a:rPr lang="en-US" sz="4800" dirty="0" err="1" smtClean="0">
+                <a:solidFill>
+                  <a:srgbClr val="000000"/>
+                </a:solidFill>
+              </a:rPr>
+              <a:t>def</a:t>
+            </a:r>
+            <a:r>
+              <a:rPr lang="en-US" sz="4800" dirty="0" smtClean="0">
+                <a:solidFill>
+                  <a:srgbClr val="000000"/>
+                </a:solidFill>
+              </a:rPr>
+              <a:t> of</a:t>
+            </a:r>
+            <a:r>
+              <a:rPr lang="en-US" sz="4800" dirty="0" smtClean="0">
+                <a:solidFill>
+                  <a:srgbClr val="0000FF"/>
+                </a:solidFill>
+              </a:rPr>
+              <a:t> </a:t>
+            </a:r>
+            <a:r>
+              <a:rPr lang="en-US" sz="4800" dirty="0" smtClean="0">
+                <a:solidFill>
+                  <a:srgbClr val="0000FF"/>
+                </a:solidFill>
+              </a:rPr>
+              <a:t>D</a:t>
+            </a:r>
+            <a:r>
+              <a:rPr lang="en-US" sz="4800" dirty="0" smtClean="0">
+                <a:solidFill>
+                  <a:srgbClr val="000000"/>
+                </a:solidFill>
+              </a:rPr>
+              <a:t>, </a:t>
+            </a:r>
+            <a:r>
+              <a:rPr lang="en-US" sz="4800" dirty="0" smtClean="0">
+                <a:solidFill>
+                  <a:srgbClr val="0000FF"/>
+                </a:solidFill>
+                <a:latin typeface="Comic Sans MS"/>
+              </a:rPr>
+              <a:t>a</a:t>
+            </a:r>
+            <a:r>
+              <a:rPr lang="en-US" sz="4800" baseline="-25000" dirty="0" smtClean="0">
+                <a:solidFill>
+                  <a:srgbClr val="F609BB"/>
+                </a:solidFill>
+                <a:latin typeface="Comic Sans MS"/>
+              </a:rPr>
+              <a:t>d </a:t>
+            </a:r>
+            <a:r>
+              <a:rPr lang="en-US" sz="4800" dirty="0" smtClean="0">
+                <a:latin typeface="Comic Sans MS"/>
+              </a:rPr>
+              <a:t>.</a:t>
+            </a:r>
+          </a:p>
+          <a:p>
+            <a:r>
+              <a:rPr lang="en-US" sz="5400" dirty="0">
+                <a:latin typeface="Comic Sans MS"/>
+              </a:rPr>
+              <a:t>Let </a:t>
+            </a:r>
+            <a:r>
+              <a:rPr lang="en-US" sz="5400" dirty="0">
+                <a:solidFill>
+                  <a:srgbClr val="0000FF"/>
+                </a:solidFill>
+                <a:latin typeface="Comic Sans MS"/>
+              </a:rPr>
+              <a:t>a</a:t>
+            </a:r>
+            <a:r>
+              <a:rPr lang="en-US" sz="5400" dirty="0">
+                <a:latin typeface="Comic Sans MS"/>
+              </a:rPr>
+              <a:t> </a:t>
+            </a:r>
+            <a:r>
+              <a:rPr lang="en-US" sz="5400" dirty="0" smtClean="0">
+                <a:latin typeface="Comic Sans MS"/>
+              </a:rPr>
+              <a:t>be </a:t>
+            </a:r>
+            <a:r>
+              <a:rPr lang="en-US" sz="5400" dirty="0" smtClean="0">
+                <a:solidFill>
+                  <a:srgbClr val="0000FF"/>
+                </a:solidFill>
+                <a:latin typeface="Comic Sans MS"/>
+              </a:rPr>
+              <a:t>a</a:t>
+            </a:r>
+            <a:r>
+              <a:rPr lang="en-US" sz="5400" baseline="-25000" dirty="0" smtClean="0">
+                <a:solidFill>
+                  <a:srgbClr val="F609BB"/>
+                </a:solidFill>
+                <a:latin typeface="Comic Sans MS"/>
+              </a:rPr>
+              <a:t>d</a:t>
+            </a:r>
+            <a:endParaRPr lang="en-US" sz="5400" dirty="0" smtClean="0">
+              <a:solidFill>
+                <a:srgbClr val="000000"/>
+              </a:solidFill>
+            </a:endParaRPr>
+          </a:p>
+        </p:txBody>
+      </p:sp>
+      <p:sp>
+        <p:nvSpPr>
+          <p:cNvPr id="5" name="TextBox 4"/>
+          <p:cNvSpPr txBox="1"/>
+          <p:nvPr/>
+        </p:nvSpPr>
+        <p:spPr>
+          <a:xfrm>
+            <a:off x="270669" y="1516845"/>
+            <a:ext cx="8087570" cy="769441"/>
+          </a:xfrm>
+          <a:prstGeom prst="rect">
+            <a:avLst/>
+          </a:prstGeom>
+          <a:noFill/>
+        </p:spPr>
+        <p:txBody>
+          <a:bodyPr wrap="none" rtlCol="0">
+            <a:spAutoFit/>
+          </a:bodyPr>
+          <a:lstStyle/>
+          <a:p>
+            <a:r>
+              <a:rPr lang="en-US" sz="4400" dirty="0" smtClean="0">
+                <a:latin typeface="Comic Sans MS"/>
+                <a:cs typeface="Comic Sans MS"/>
+              </a:rPr>
+              <a:t>Pf: say have fcn  </a:t>
+            </a:r>
+            <a:r>
+              <a:rPr lang="en-US" sz="4400" dirty="0" smtClean="0">
+                <a:solidFill>
+                  <a:srgbClr val="0000FF"/>
+                </a:solidFill>
+                <a:latin typeface="Comic Sans MS"/>
+                <a:cs typeface="Comic Sans MS"/>
+              </a:rPr>
+              <a:t>f:A→pow(A)</a:t>
+            </a:r>
+            <a:r>
+              <a:rPr lang="en-US" sz="4400" dirty="0" smtClean="0">
+                <a:latin typeface="Comic Sans MS"/>
+                <a:cs typeface="Comic Sans MS"/>
+              </a:rPr>
+              <a:t>.  </a:t>
+            </a:r>
+          </a:p>
+        </p:txBody>
+      </p:sp>
+    </p:spTree>
+    <p:custDataLst>
+      <p:tags r:id="rId1"/>
+    </p:custDataLst>
+    <p:extLst>
+      <p:ext uri="{BB962C8B-B14F-4D97-AF65-F5344CB8AC3E}">
+        <p14:creationId xmlns:p14="http://schemas.microsoft.com/office/powerpoint/2010/main" val="1307526569"/>
+      </p:ext>
+    </p:extLst>
+  </p:cSld>
+  <p:clrMapOvr>
+    <a:masterClrMapping/>
+  </p:clrMapOvr>
+  <mc:AlternateContent xmlns:mc="http://schemas.openxmlformats.org/markup-compatibility/2006">
+    <mc:Choice xmlns:p14="http://schemas.microsoft.com/office/powerpoint/2010/main" Requires="p14">
+      <p:transition spd="med" p14:dur="650">
+        <p:fade/>
+      </p:transition>
+    </mc:Choice>
+    <mc:Fallback>
+      <p:transition xmlns:p14="http://schemas.microsoft.com/office/powerpoint/2010/main" spd="med">
+        <p:fade/>
+      </p:transition>
+    </mc:Fallback>
+  </mc:AlternateContent>
+  <p:timing>
+    <p:tnLst>
+      <p:par>
+        <p:cTn xmlns:p14="http://schemas.microsoft.com/office/powerpoint/2010/main" id="1" dur="indefinite" restart="never" nodeType="tmRoot"/>
+      </p:par>
+    </p:tnLst>
+  </p:timing>
+</p:sld>
+</file>
+
+<file path=ppt/slides/slide15.xml><?xml version="1.0" encoding="utf-8"?>
+<p:sld xmlns:a="http://schemas.openxmlformats.org/drawingml/2006/main" xmlns:r="http://schemas.openxmlformats.org/officeDocument/2006/relationships" xmlns:p="http://schemas.openxmlformats.org/presentationml/2006/main">
+  <p:cSld>
+    <p:spTree>
+      <p:nvGrpSpPr>
+        <p:cNvPr id="1" name=""/>
+        <p:cNvGrpSpPr/>
+        <p:nvPr/>
+      </p:nvGrpSpPr>
+      <p:grpSpPr>
+        <a:xfrm>
+          <a:off x="0" y="0"/>
+          <a:ext cx="0" cy="0"/>
+          <a:chOff x="0" y="0"/>
+          <a:chExt cx="0" cy="0"/>
+        </a:xfrm>
+      </p:grpSpPr>
+      <p:sp>
+        <p:nvSpPr>
+          <p:cNvPr id="2" name="Title 1"/>
+          <p:cNvSpPr>
+            <a:spLocks noGrp="1"/>
+          </p:cNvSpPr>
+          <p:nvPr>
+            <p:ph type="title"/>
+          </p:nvPr>
+        </p:nvSpPr>
+        <p:spPr>
+          <a:xfrm>
+            <a:off x="1748862" y="355344"/>
+            <a:ext cx="5649452" cy="980204"/>
+          </a:xfrm>
+        </p:spPr>
+        <p:txBody>
+          <a:bodyPr/>
+          <a:lstStyle/>
+          <a:p>
+            <a:r>
+              <a:rPr lang="en-US" b="0" dirty="0" smtClean="0">
+                <a:solidFill>
+                  <a:srgbClr val="FF0000"/>
+                </a:solidFill>
+              </a:rPr>
+              <a:t>NOT</a:t>
+            </a:r>
+            <a:r>
+              <a:rPr lang="en-US" sz="4400" b="0" dirty="0" smtClean="0">
+                <a:solidFill>
+                  <a:srgbClr val="0000FF"/>
+                </a:solidFill>
+              </a:rPr>
+              <a:t>[</a:t>
+            </a:r>
+            <a:r>
+              <a:rPr lang="en-US" sz="4000" b="0" dirty="0" smtClean="0">
+                <a:solidFill>
+                  <a:srgbClr val="0000FF"/>
+                </a:solidFill>
+              </a:rPr>
+              <a:t>A </a:t>
+            </a:r>
+            <a:r>
+              <a:rPr lang="en-US" sz="4000" b="0" dirty="0">
+                <a:solidFill>
+                  <a:srgbClr val="9933FF"/>
+                </a:solidFill>
+              </a:rPr>
+              <a:t>surj</a:t>
+            </a:r>
+            <a:r>
+              <a:rPr lang="en-US" sz="4000" b="0" dirty="0">
+                <a:solidFill>
+                  <a:srgbClr val="0000FF"/>
+                </a:solidFill>
+              </a:rPr>
+              <a:t> </a:t>
+            </a:r>
+            <a:r>
+              <a:rPr lang="en-US" sz="4000" b="0" dirty="0" smtClean="0">
+                <a:solidFill>
+                  <a:srgbClr val="0000FF"/>
+                </a:solidFill>
+              </a:rPr>
+              <a:t>Pow(A)</a:t>
+            </a:r>
+            <a:r>
+              <a:rPr lang="en-US" sz="4400" b="0" dirty="0" smtClean="0">
+                <a:solidFill>
+                  <a:srgbClr val="0000FF"/>
+                </a:solidFill>
+              </a:rPr>
+              <a:t>]</a:t>
+            </a:r>
+            <a:endParaRPr lang="en-US" sz="4000" b="0" dirty="0">
+              <a:solidFill>
+                <a:srgbClr val="0000FF"/>
+              </a:solidFill>
+            </a:endParaRPr>
+          </a:p>
+        </p:txBody>
+      </p:sp>
+      <p:sp>
+        <p:nvSpPr>
+          <p:cNvPr id="3" name="Content Placeholder 2"/>
+          <p:cNvSpPr>
+            <a:spLocks noGrp="1"/>
+          </p:cNvSpPr>
+          <p:nvPr>
+            <p:ph idx="1"/>
+          </p:nvPr>
+        </p:nvSpPr>
+        <p:spPr>
+          <a:xfrm>
+            <a:off x="185741" y="2299778"/>
+            <a:ext cx="8849199" cy="2925827"/>
+          </a:xfrm>
+        </p:spPr>
+        <p:txBody>
+          <a:bodyPr/>
+          <a:lstStyle/>
+          <a:p>
+            <a:pPr algn="ctr"/>
+            <a:r>
+              <a:rPr lang="en-US" sz="5400" dirty="0" smtClean="0">
+                <a:solidFill>
+                  <a:srgbClr val="0000FF"/>
+                </a:solidFill>
+              </a:rPr>
+              <a:t>  </a:t>
+            </a:r>
+            <a:r>
+              <a:rPr lang="en-US" sz="5400" dirty="0">
+                <a:solidFill>
+                  <a:srgbClr val="0000FF"/>
+                </a:solidFill>
+                <a:latin typeface="Comic Sans MS"/>
+              </a:rPr>
+              <a:t>a</a:t>
+            </a:r>
+            <a:r>
+              <a:rPr lang="en-US" sz="5400" baseline="-25000" dirty="0">
+                <a:solidFill>
+                  <a:srgbClr val="F609BB"/>
+                </a:solidFill>
+                <a:latin typeface="Comic Sans MS"/>
+              </a:rPr>
+              <a:t>d</a:t>
+            </a:r>
+            <a:r>
+              <a:rPr lang="en-US" sz="5400" dirty="0" smtClean="0">
+                <a:solidFill>
+                  <a:srgbClr val="0000FF"/>
+                </a:solidFill>
+              </a:rPr>
+              <a:t> </a:t>
+            </a:r>
+            <a:r>
+              <a:rPr lang="en-US" sz="5400" dirty="0" smtClean="0">
+                <a:solidFill>
+                  <a:srgbClr val="FF0000"/>
+                </a:solidFill>
+                <a:latin typeface="Symbol" charset="2"/>
+                <a:cs typeface="Symbol" charset="2"/>
+              </a:rPr>
+              <a:t>∈</a:t>
+            </a:r>
+            <a:r>
+              <a:rPr lang="en-US" sz="5400" dirty="0">
+                <a:solidFill>
+                  <a:srgbClr val="0000FF"/>
+                </a:solidFill>
+                <a:latin typeface="Comic Sans MS"/>
+              </a:rPr>
+              <a:t>f(a</a:t>
+            </a:r>
+            <a:r>
+              <a:rPr lang="en-US" sz="5400" baseline="-25000" dirty="0">
+                <a:solidFill>
+                  <a:srgbClr val="F609BB"/>
+                </a:solidFill>
+                <a:latin typeface="Comic Sans MS"/>
+              </a:rPr>
+              <a:t>d</a:t>
+            </a:r>
+            <a:r>
+              <a:rPr lang="en-US" sz="5400" dirty="0" smtClean="0">
+                <a:solidFill>
+                  <a:srgbClr val="0000FF"/>
+                </a:solidFill>
+                <a:latin typeface="Comic Sans MS"/>
+              </a:rPr>
+              <a:t>) </a:t>
+            </a:r>
+            <a:r>
+              <a:rPr lang="en-US" sz="5400" dirty="0" smtClean="0">
+                <a:solidFill>
+                  <a:srgbClr val="0000FF"/>
+                </a:solidFill>
+              </a:rPr>
+              <a:t>  </a:t>
+            </a:r>
+            <a:r>
+              <a:rPr lang="en-US" sz="4400" dirty="0" smtClean="0">
+                <a:solidFill>
+                  <a:srgbClr val="000000"/>
+                </a:solidFill>
+              </a:rPr>
+              <a:t>IFF</a:t>
+            </a:r>
+            <a:r>
+              <a:rPr lang="en-US" sz="4400" dirty="0" smtClean="0">
+                <a:solidFill>
+                  <a:srgbClr val="FF0000"/>
+                </a:solidFill>
+              </a:rPr>
+              <a:t> </a:t>
+            </a:r>
+            <a:r>
+              <a:rPr lang="en-US" sz="5400" dirty="0" smtClean="0">
+                <a:solidFill>
+                  <a:srgbClr val="0000FF"/>
+                </a:solidFill>
+              </a:rPr>
+              <a:t> </a:t>
+            </a:r>
+            <a:r>
+              <a:rPr lang="en-US" sz="5400" dirty="0">
+                <a:solidFill>
+                  <a:srgbClr val="0000FF"/>
+                </a:solidFill>
+                <a:latin typeface="Comic Sans MS"/>
+              </a:rPr>
+              <a:t>a</a:t>
+            </a:r>
+            <a:r>
+              <a:rPr lang="en-US" sz="5400" baseline="-25000" dirty="0">
+                <a:solidFill>
+                  <a:srgbClr val="F609BB"/>
+                </a:solidFill>
+                <a:latin typeface="Comic Sans MS"/>
+              </a:rPr>
+              <a:t>d</a:t>
+            </a:r>
+            <a:r>
+              <a:rPr lang="en-US" sz="5400" dirty="0" smtClean="0">
+                <a:solidFill>
+                  <a:srgbClr val="0000FF"/>
+                </a:solidFill>
+              </a:rPr>
+              <a:t> </a:t>
+            </a:r>
+            <a:r>
+              <a:rPr lang="en-US" sz="5400" dirty="0" smtClean="0">
+                <a:solidFill>
+                  <a:srgbClr val="FF0000"/>
+                </a:solidFill>
+                <a:latin typeface="Symbol" charset="2"/>
+                <a:cs typeface="Symbol" charset="2"/>
+                <a:sym typeface="Euclid Symbol"/>
+              </a:rPr>
+              <a:t>∉</a:t>
+            </a:r>
+            <a:r>
+              <a:rPr lang="en-US" sz="5400" dirty="0" smtClean="0">
+                <a:solidFill>
+                  <a:srgbClr val="0000FF"/>
+                </a:solidFill>
+              </a:rPr>
+              <a:t> f</a:t>
+            </a:r>
+            <a:r>
+              <a:rPr lang="en-US" sz="5400" dirty="0" smtClean="0">
+                <a:solidFill>
+                  <a:srgbClr val="0000FF"/>
+                </a:solidFill>
+              </a:rPr>
+              <a:t>(</a:t>
+            </a:r>
+            <a:r>
+              <a:rPr lang="en-US" sz="5400" dirty="0">
+                <a:solidFill>
+                  <a:srgbClr val="0000FF"/>
+                </a:solidFill>
+                <a:latin typeface="Comic Sans MS"/>
+              </a:rPr>
+              <a:t>a</a:t>
+            </a:r>
+            <a:r>
+              <a:rPr lang="en-US" sz="5400" baseline="-25000" dirty="0">
+                <a:solidFill>
+                  <a:srgbClr val="F609BB"/>
+                </a:solidFill>
+                <a:latin typeface="Comic Sans MS"/>
+              </a:rPr>
+              <a:t>d</a:t>
+            </a:r>
+            <a:r>
+              <a:rPr lang="en-US" sz="5400" dirty="0" smtClean="0">
+                <a:solidFill>
+                  <a:srgbClr val="0000FF"/>
+                </a:solidFill>
+              </a:rPr>
+              <a:t>)</a:t>
+            </a:r>
+          </a:p>
+          <a:p>
+            <a:r>
+              <a:rPr lang="en-US" sz="4800" dirty="0" smtClean="0">
+                <a:solidFill>
+                  <a:srgbClr val="000000"/>
+                </a:solidFill>
+              </a:rPr>
+              <a:t>for all </a:t>
+            </a:r>
+            <a:r>
+              <a:rPr lang="en-US" sz="4800" dirty="0">
+                <a:solidFill>
+                  <a:srgbClr val="0000FF"/>
+                </a:solidFill>
+              </a:rPr>
+              <a:t>a </a:t>
+            </a:r>
+            <a:r>
+              <a:rPr lang="en-US" sz="4800" dirty="0" smtClean="0">
+                <a:solidFill>
+                  <a:srgbClr val="0000FF"/>
+                </a:solidFill>
+                <a:latin typeface="Symbol" charset="2"/>
+                <a:cs typeface="Symbol" charset="2"/>
+              </a:rPr>
+              <a:t>∈</a:t>
+            </a:r>
+            <a:r>
+              <a:rPr lang="en-US" sz="4800" dirty="0" smtClean="0">
+                <a:solidFill>
+                  <a:srgbClr val="0000FF"/>
+                </a:solidFill>
+              </a:rPr>
+              <a:t>A </a:t>
+            </a:r>
+            <a:r>
+              <a:rPr lang="en-US" sz="4800" dirty="0" smtClean="0">
+                <a:solidFill>
+                  <a:srgbClr val="000000"/>
+                </a:solidFill>
+              </a:rPr>
+              <a:t>by </a:t>
+            </a:r>
+            <a:r>
+              <a:rPr lang="en-US" sz="4800" dirty="0" err="1" smtClean="0">
+                <a:solidFill>
+                  <a:srgbClr val="000000"/>
+                </a:solidFill>
+              </a:rPr>
+              <a:t>def</a:t>
+            </a:r>
+            <a:r>
+              <a:rPr lang="en-US" sz="4800" dirty="0" smtClean="0">
+                <a:solidFill>
+                  <a:srgbClr val="000000"/>
+                </a:solidFill>
+              </a:rPr>
+              <a:t> of</a:t>
+            </a:r>
+            <a:r>
+              <a:rPr lang="en-US" sz="4800" dirty="0" smtClean="0">
+                <a:solidFill>
+                  <a:srgbClr val="0000FF"/>
+                </a:solidFill>
+              </a:rPr>
+              <a:t> </a:t>
+            </a:r>
+            <a:r>
+              <a:rPr lang="en-US" sz="4800" dirty="0" smtClean="0">
+                <a:solidFill>
+                  <a:srgbClr val="0000FF"/>
+                </a:solidFill>
+              </a:rPr>
+              <a:t>D</a:t>
+            </a:r>
+            <a:r>
+              <a:rPr lang="en-US" sz="4800" dirty="0" smtClean="0">
+                <a:solidFill>
+                  <a:srgbClr val="000000"/>
+                </a:solidFill>
+              </a:rPr>
+              <a:t>, </a:t>
+            </a:r>
+            <a:r>
+              <a:rPr lang="en-US" sz="4800" dirty="0" smtClean="0">
+                <a:solidFill>
+                  <a:srgbClr val="0000FF"/>
+                </a:solidFill>
+                <a:latin typeface="Comic Sans MS"/>
+              </a:rPr>
+              <a:t>a</a:t>
+            </a:r>
+            <a:r>
+              <a:rPr lang="en-US" sz="4800" baseline="-25000" dirty="0" smtClean="0">
+                <a:solidFill>
+                  <a:srgbClr val="F609BB"/>
+                </a:solidFill>
+                <a:latin typeface="Comic Sans MS"/>
+              </a:rPr>
+              <a:t>d </a:t>
+            </a:r>
+            <a:r>
+              <a:rPr lang="en-US" sz="4800" dirty="0" smtClean="0">
+                <a:latin typeface="Comic Sans MS"/>
+              </a:rPr>
+              <a:t>.</a:t>
+            </a:r>
+          </a:p>
+          <a:p>
+            <a:r>
+              <a:rPr lang="en-US" sz="5400" dirty="0">
+                <a:latin typeface="Comic Sans MS"/>
+              </a:rPr>
+              <a:t>Let </a:t>
+            </a:r>
+            <a:r>
+              <a:rPr lang="en-US" sz="5400" dirty="0">
+                <a:solidFill>
+                  <a:srgbClr val="0000FF"/>
+                </a:solidFill>
+                <a:latin typeface="Comic Sans MS"/>
+              </a:rPr>
+              <a:t>a</a:t>
+            </a:r>
+            <a:r>
+              <a:rPr lang="en-US" sz="5400" dirty="0">
+                <a:latin typeface="Comic Sans MS"/>
+              </a:rPr>
+              <a:t> </a:t>
+            </a:r>
+            <a:r>
+              <a:rPr lang="en-US" sz="5400" dirty="0" smtClean="0">
+                <a:latin typeface="Comic Sans MS"/>
+              </a:rPr>
+              <a:t>be </a:t>
+            </a:r>
+            <a:r>
+              <a:rPr lang="en-US" sz="5400" dirty="0" smtClean="0">
+                <a:solidFill>
+                  <a:srgbClr val="0000FF"/>
+                </a:solidFill>
+                <a:latin typeface="Comic Sans MS"/>
+              </a:rPr>
+              <a:t>a</a:t>
+            </a:r>
+            <a:r>
+              <a:rPr lang="en-US" sz="5400" baseline="-25000" dirty="0" smtClean="0">
+                <a:solidFill>
+                  <a:srgbClr val="F609BB"/>
+                </a:solidFill>
+                <a:latin typeface="Comic Sans MS"/>
+              </a:rPr>
+              <a:t>d</a:t>
+            </a:r>
+            <a:endParaRPr lang="en-US" sz="5400" dirty="0" smtClean="0">
+              <a:solidFill>
+                <a:srgbClr val="FF0000"/>
+              </a:solidFill>
+            </a:endParaRPr>
+          </a:p>
+        </p:txBody>
+      </p:sp>
+      <p:sp>
+        <p:nvSpPr>
+          <p:cNvPr id="5" name="TextBox 4"/>
+          <p:cNvSpPr txBox="1"/>
+          <p:nvPr/>
+        </p:nvSpPr>
+        <p:spPr>
+          <a:xfrm>
+            <a:off x="270669" y="1516845"/>
+            <a:ext cx="8087570" cy="769441"/>
+          </a:xfrm>
+          <a:prstGeom prst="rect">
+            <a:avLst/>
+          </a:prstGeom>
+          <a:noFill/>
+        </p:spPr>
+        <p:txBody>
+          <a:bodyPr wrap="none" rtlCol="0">
+            <a:spAutoFit/>
+          </a:bodyPr>
+          <a:lstStyle/>
+          <a:p>
+            <a:r>
+              <a:rPr lang="en-US" sz="4400" dirty="0" smtClean="0">
+                <a:latin typeface="Comic Sans MS"/>
+                <a:cs typeface="Comic Sans MS"/>
+              </a:rPr>
+              <a:t>Pf: say have fcn  </a:t>
+            </a:r>
+            <a:r>
+              <a:rPr lang="en-US" sz="4400" dirty="0" smtClean="0">
+                <a:solidFill>
+                  <a:srgbClr val="0000FF"/>
+                </a:solidFill>
+                <a:latin typeface="Comic Sans MS"/>
+                <a:cs typeface="Comic Sans MS"/>
+              </a:rPr>
+              <a:t>f:A→pow(A)</a:t>
+            </a:r>
+            <a:r>
+              <a:rPr lang="en-US" sz="4400" dirty="0" smtClean="0">
+                <a:latin typeface="Comic Sans MS"/>
+                <a:cs typeface="Comic Sans MS"/>
+              </a:rPr>
+              <a:t>.  </a:t>
+            </a:r>
+          </a:p>
+        </p:txBody>
+      </p:sp>
+      <p:sp>
+        <p:nvSpPr>
+          <p:cNvPr id="4" name="TextBox 3"/>
+          <p:cNvSpPr txBox="1"/>
+          <p:nvPr/>
+        </p:nvSpPr>
+        <p:spPr>
+          <a:xfrm>
+            <a:off x="3664389" y="4178545"/>
+            <a:ext cx="4897908" cy="923330"/>
+          </a:xfrm>
+          <a:prstGeom prst="rect">
+            <a:avLst/>
+          </a:prstGeom>
+          <a:noFill/>
+        </p:spPr>
+        <p:txBody>
+          <a:bodyPr wrap="none" rtlCol="0">
+            <a:spAutoFit/>
+          </a:bodyPr>
+          <a:lstStyle/>
+          <a:p>
+            <a:pPr marL="342900" lvl="0" indent="-342900">
+              <a:spcBef>
+                <a:spcPct val="20000"/>
+              </a:spcBef>
+            </a:pPr>
+            <a:r>
+              <a:rPr lang="en-US" sz="5400" kern="0" dirty="0">
+                <a:solidFill>
+                  <a:srgbClr val="000000"/>
+                </a:solidFill>
+                <a:latin typeface="Comic Sans MS"/>
+                <a:cs typeface="Comic Sans MS"/>
+              </a:rPr>
+              <a:t>: </a:t>
+            </a:r>
+            <a:r>
+              <a:rPr lang="en-US" sz="5400" kern="0" dirty="0" smtClean="0">
+                <a:solidFill>
+                  <a:srgbClr val="FF0000"/>
+                </a:solidFill>
+                <a:latin typeface="Comic Sans MS"/>
+                <a:cs typeface="Comic Sans MS"/>
+              </a:rPr>
+              <a:t>contradiction</a:t>
+            </a:r>
+            <a:endParaRPr lang="en-US" sz="4400" dirty="0" smtClean="0">
+              <a:latin typeface="Comic Sans MS"/>
+              <a:cs typeface="Comic Sans MS"/>
+            </a:endParaRPr>
+          </a:p>
+        </p:txBody>
+      </p:sp>
+    </p:spTree>
+    <p:custDataLst>
+      <p:tags r:id="rId1"/>
+    </p:custDataLst>
+    <p:extLst>
+      <p:ext uri="{BB962C8B-B14F-4D97-AF65-F5344CB8AC3E}">
+        <p14:creationId xmlns:p14="http://schemas.microsoft.com/office/powerpoint/2010/main" val="1265390406"/>
+      </p:ext>
+    </p:extLst>
+  </p:cSld>
+  <p:clrMapOvr>
+    <a:masterClrMapping/>
+  </p:clrMapOvr>
+  <mc:AlternateContent xmlns:mc="http://schemas.openxmlformats.org/markup-compatibility/2006">
+    <mc:Choice xmlns:p14="http://schemas.microsoft.com/office/powerpoint/2010/main" Requires="p14">
+      <p:transition spd="med" p14:dur="650">
+        <p:fade/>
+      </p:transition>
+    </mc:Choice>
+    <mc:Fallback>
+      <p:transition xmlns:p14="http://schemas.microsoft.com/office/powerpoint/2010/main" spd="med">
+        <p:fade/>
+      </p:transition>
+    </mc:Fallback>
+  </mc:AlternateContent>
+  <p:timing>
+    <p:tnLst>
+      <p:par>
+        <p:cTn xmlns:p14="http://schemas.microsoft.com/office/powerpoint/2010/main" id="1" dur="indefinite" restart="never" nodeType="tmRoot">
+          <p:childTnLst>
+            <p:seq concurrent="1" nextAc="seek">
+              <p:cTn id="2" dur="indefinite" nodeType="mainSeq">
+                <p:childTnLst>
+                  <p:par>
+                    <p:cTn id="3" fill="hold">
+                      <p:stCondLst>
+                        <p:cond delay="indefinite"/>
+                        <p:cond evt="onBegin" delay="0">
+                          <p:tn val="2"/>
+                        </p:cond>
+                      </p:stCondLst>
+                      <p:childTnLst>
+                        <p:par>
+                          <p:cTn id="4" fill="hold">
+                            <p:stCondLst>
+                              <p:cond delay="0"/>
+                            </p:stCondLst>
+                            <p:childTnLst>
+                              <p:par>
+                                <p:cTn id="5" presetID="15" presetClass="entr" presetSubtype="0" fill="hold" grpId="0" nodeType="afterEffect">
+                                  <p:stCondLst>
+                                    <p:cond delay="500"/>
+                                  </p:stCondLst>
+                                  <p:childTnLst>
+                                    <p:set>
+                                      <p:cBhvr>
+                                        <p:cTn id="6" dur="1" fill="hold">
+                                          <p:stCondLst>
+                                            <p:cond delay="0"/>
+                                          </p:stCondLst>
+                                        </p:cTn>
+                                        <p:tgtEl>
+                                          <p:spTgt spid="4"/>
+                                        </p:tgtEl>
+                                        <p:attrNameLst>
+                                          <p:attrName>style.visibility</p:attrName>
+                                        </p:attrNameLst>
+                                      </p:cBhvr>
+                                      <p:to>
+                                        <p:strVal val="visible"/>
+                                      </p:to>
+                                    </p:set>
+                                    <p:anim calcmode="lin" valueType="num">
+                                      <p:cBhvr>
+                                        <p:cTn id="7" dur="1000" fill="hold"/>
+                                        <p:tgtEl>
+                                          <p:spTgt spid="4"/>
+                                        </p:tgtEl>
+                                        <p:attrNameLst>
+                                          <p:attrName>ppt_w</p:attrName>
+                                        </p:attrNameLst>
+                                      </p:cBhvr>
+                                      <p:tavLst>
+                                        <p:tav tm="0">
+                                          <p:val>
+                                            <p:fltVal val="0"/>
+                                          </p:val>
+                                        </p:tav>
+                                        <p:tav tm="100000">
+                                          <p:val>
+                                            <p:strVal val="#ppt_w"/>
+                                          </p:val>
+                                        </p:tav>
+                                      </p:tavLst>
+                                    </p:anim>
+                                    <p:anim calcmode="lin" valueType="num">
+                                      <p:cBhvr>
+                                        <p:cTn id="8" dur="1000" fill="hold"/>
+                                        <p:tgtEl>
+                                          <p:spTgt spid="4"/>
+                                        </p:tgtEl>
+                                        <p:attrNameLst>
+                                          <p:attrName>ppt_h</p:attrName>
+                                        </p:attrNameLst>
+                                      </p:cBhvr>
+                                      <p:tavLst>
+                                        <p:tav tm="0">
+                                          <p:val>
+                                            <p:fltVal val="0"/>
+                                          </p:val>
+                                        </p:tav>
+                                        <p:tav tm="100000">
+                                          <p:val>
+                                            <p:strVal val="#ppt_h"/>
+                                          </p:val>
+                                        </p:tav>
+                                      </p:tavLst>
+                                    </p:anim>
+                                    <p:anim calcmode="lin" valueType="num">
+                                      <p:cBhvr>
+                                        <p:cTn id="9" dur="1000" fill="hold"/>
+                                        <p:tgtEl>
+                                          <p:spTgt spid="4"/>
+                                        </p:tgtEl>
+                                        <p:attrNameLst>
+                                          <p:attrName>ppt_x</p:attrName>
+                                        </p:attrNameLst>
+                                      </p:cBhvr>
+                                      <p:tavLst>
+                                        <p:tav tm="0" fmla="#ppt_x+(cos(-2*pi*(1-$))*-#ppt_x-sin(-2*pi*(1-$))*(1-#ppt_y))*(1-$)">
+                                          <p:val>
+                                            <p:fltVal val="0"/>
+                                          </p:val>
+                                        </p:tav>
+                                        <p:tav tm="100000">
+                                          <p:val>
+                                            <p:fltVal val="1"/>
+                                          </p:val>
+                                        </p:tav>
+                                      </p:tavLst>
+                                    </p:anim>
+                                    <p:anim calcmode="lin" valueType="num">
+                                      <p:cBhvr>
+                                        <p:cTn id="10" dur="1000" fill="hold"/>
+                                        <p:tgtEl>
+                                          <p:spTgt spid="4"/>
+                                        </p:tgtEl>
+                                        <p:attrNameLst>
+                                          <p:attrName>ppt_y</p:attrName>
+                                        </p:attrNameLst>
+                                      </p:cBhvr>
+                                      <p:tavLst>
+                                        <p:tav tm="0" fmla="#ppt_y+(sin(-2*pi*(1-$))*-#ppt_x+cos(-2*pi*(1-$))*(1-#ppt_y))*(1-$)">
+                                          <p:val>
+                                            <p:fltVal val="0"/>
+                                          </p:val>
+                                        </p:tav>
+                                        <p:tav tm="100000">
+                                          <p:val>
+                                            <p:fltVal val="1"/>
+                                          </p:val>
+                                        </p:tav>
+                                      </p:tavLst>
+                                    </p:anim>
+                                  </p:childTnLst>
+                                </p:cTn>
+                              </p:par>
+                            </p:childTnLst>
+                          </p:cTn>
+                        </p:par>
+                      </p:childTnLst>
+                    </p:cTn>
+                  </p:par>
+                </p:childTnLst>
+              </p:cTn>
+              <p:prevCondLst>
+                <p:cond evt="onPrev" delay="0">
+                  <p:tgtEl>
+                    <p:sldTgt/>
+                  </p:tgtEl>
+                </p:cond>
+              </p:prevCondLst>
+              <p:nextCondLst>
+                <p:cond evt="onNext" delay="0">
+                  <p:tgtEl>
+                    <p:sldTgt/>
+                  </p:tgtEl>
+                </p:cond>
+              </p:nextCondLst>
+            </p:seq>
+          </p:childTnLst>
+        </p:cTn>
+      </p:par>
+    </p:tnLst>
+    <p:bldLst>
+      <p:bldP spid="4" grpId="0"/>
+    </p:bldLst>
+  </p:timing>
+</p:sld>
+</file>
+
+<file path=ppt/slides/slide16.xml><?xml version="1.0" encoding="utf-8"?>
+<p:sld xmlns:a="http://schemas.openxmlformats.org/drawingml/2006/main" xmlns:r="http://schemas.openxmlformats.org/officeDocument/2006/relationships" xmlns:p="http://schemas.openxmlformats.org/presentationml/2006/main">
+  <p:cSld>
+    <p:spTree>
+      <p:nvGrpSpPr>
+        <p:cNvPr id="1" name=""/>
+        <p:cNvGrpSpPr/>
+        <p:nvPr/>
+      </p:nvGrpSpPr>
+      <p:grpSpPr>
+        <a:xfrm>
+          <a:off x="0" y="0"/>
+          <a:ext cx="0" cy="0"/>
+          <a:chOff x="0" y="0"/>
+          <a:chExt cx="0" cy="0"/>
+        </a:xfrm>
+      </p:grpSpPr>
+      <p:sp>
+        <p:nvSpPr>
+          <p:cNvPr id="2" name="Title 1"/>
+          <p:cNvSpPr>
+            <a:spLocks noGrp="1"/>
+          </p:cNvSpPr>
+          <p:nvPr>
+            <p:ph type="title"/>
+          </p:nvPr>
+        </p:nvSpPr>
+        <p:spPr>
+          <a:xfrm>
+            <a:off x="1748862" y="355344"/>
+            <a:ext cx="5649452" cy="980204"/>
+          </a:xfrm>
+        </p:spPr>
+        <p:txBody>
+          <a:bodyPr/>
+          <a:lstStyle/>
+          <a:p>
+            <a:r>
+              <a:rPr lang="en-US" b="0" dirty="0" smtClean="0">
+                <a:solidFill>
+                  <a:srgbClr val="FF0000"/>
+                </a:solidFill>
+              </a:rPr>
+              <a:t>NOT</a:t>
+            </a:r>
+            <a:r>
+              <a:rPr lang="en-US" sz="4400" b="0" dirty="0" smtClean="0">
+                <a:solidFill>
+                  <a:srgbClr val="0000FF"/>
+                </a:solidFill>
+              </a:rPr>
+              <a:t>[</a:t>
+            </a:r>
+            <a:r>
+              <a:rPr lang="en-US" sz="4000" b="0" dirty="0" smtClean="0">
+                <a:solidFill>
+                  <a:srgbClr val="0000FF"/>
+                </a:solidFill>
+              </a:rPr>
+              <a:t>A </a:t>
+            </a:r>
+            <a:r>
+              <a:rPr lang="en-US" sz="4000" b="0" dirty="0">
+                <a:solidFill>
+                  <a:srgbClr val="9933FF"/>
+                </a:solidFill>
+              </a:rPr>
+              <a:t>surj</a:t>
+            </a:r>
+            <a:r>
+              <a:rPr lang="en-US" sz="4000" b="0" dirty="0">
+                <a:solidFill>
+                  <a:srgbClr val="0000FF"/>
+                </a:solidFill>
+              </a:rPr>
+              <a:t> </a:t>
+            </a:r>
+            <a:r>
+              <a:rPr lang="en-US" sz="4000" b="0" dirty="0" smtClean="0">
+                <a:solidFill>
+                  <a:srgbClr val="0000FF"/>
+                </a:solidFill>
+              </a:rPr>
+              <a:t>Pow(A)</a:t>
+            </a:r>
+            <a:r>
+              <a:rPr lang="en-US" sz="4400" b="0" dirty="0" smtClean="0">
+                <a:solidFill>
+                  <a:srgbClr val="0000FF"/>
+                </a:solidFill>
+              </a:rPr>
+              <a:t>]</a:t>
+            </a:r>
+            <a:endParaRPr lang="en-US" sz="4000" b="0" dirty="0">
+              <a:solidFill>
+                <a:srgbClr val="0000FF"/>
+              </a:solidFill>
+            </a:endParaRPr>
+          </a:p>
+        </p:txBody>
+      </p:sp>
+      <p:sp>
+        <p:nvSpPr>
+          <p:cNvPr id="3" name="Content Placeholder 2"/>
+          <p:cNvSpPr>
+            <a:spLocks noGrp="1"/>
+          </p:cNvSpPr>
+          <p:nvPr>
+            <p:ph idx="1"/>
+          </p:nvPr>
+        </p:nvSpPr>
+        <p:spPr>
+          <a:xfrm>
+            <a:off x="589592" y="1664588"/>
+            <a:ext cx="7967992" cy="3954596"/>
+          </a:xfrm>
+        </p:spPr>
+        <p:txBody>
+          <a:bodyPr/>
+          <a:lstStyle/>
+          <a:p>
+            <a:r>
+              <a:rPr lang="en-US" sz="5400" dirty="0" smtClean="0">
+                <a:solidFill>
+                  <a:schemeClr val="tx2"/>
+                </a:solidFill>
+              </a:rPr>
+              <a:t>So no </a:t>
+            </a:r>
+            <a:r>
+              <a:rPr lang="en-US" sz="5400" dirty="0" smtClean="0">
+                <a:solidFill>
+                  <a:srgbClr val="0000FF"/>
+                </a:solidFill>
+              </a:rPr>
+              <a:t>f</a:t>
+            </a:r>
+            <a:r>
+              <a:rPr lang="en-US" sz="5400" dirty="0" smtClean="0">
+                <a:solidFill>
+                  <a:schemeClr val="tx2"/>
+                </a:solidFill>
+              </a:rPr>
+              <a:t>-arrow into</a:t>
+            </a:r>
+            <a:r>
+              <a:rPr lang="en-US" sz="5400" dirty="0" smtClean="0">
+                <a:solidFill>
+                  <a:srgbClr val="0000FF"/>
+                </a:solidFill>
+              </a:rPr>
+              <a:t> D</a:t>
+            </a:r>
+            <a:r>
+              <a:rPr lang="en-US" sz="5400" dirty="0" smtClean="0">
+                <a:solidFill>
+                  <a:srgbClr val="000000"/>
+                </a:solidFill>
+              </a:rPr>
+              <a:t>.</a:t>
+            </a:r>
+          </a:p>
+          <a:p>
+            <a:r>
+              <a:rPr lang="en-US" sz="5400" dirty="0" smtClean="0">
+                <a:solidFill>
+                  <a:srgbClr val="0000FF"/>
+                </a:solidFill>
+              </a:rPr>
+              <a:t>f</a:t>
+            </a:r>
+            <a:r>
+              <a:rPr lang="en-US" sz="5400" dirty="0" smtClean="0"/>
+              <a:t> is not a surjection.</a:t>
+            </a:r>
+          </a:p>
+          <a:p>
+            <a:r>
+              <a:rPr lang="en-US" sz="5400" dirty="0" smtClean="0">
+                <a:solidFill>
+                  <a:srgbClr val="008000"/>
+                </a:solidFill>
+              </a:rPr>
+              <a:t>QED</a:t>
+            </a:r>
+            <a:endParaRPr lang="en-US" sz="5400" dirty="0">
+              <a:solidFill>
+                <a:srgbClr val="008000"/>
+              </a:solidFill>
+            </a:endParaRPr>
+          </a:p>
+        </p:txBody>
+      </p:sp>
+    </p:spTree>
+    <p:custDataLst>
+      <p:tags r:id="rId1"/>
+    </p:custDataLst>
+    <p:extLst>
+      <p:ext uri="{BB962C8B-B14F-4D97-AF65-F5344CB8AC3E}">
+        <p14:creationId xmlns:p14="http://schemas.microsoft.com/office/powerpoint/2010/main" val="3905913044"/>
+      </p:ext>
+    </p:extLst>
+  </p:cSld>
+  <p:clrMapOvr>
+    <a:masterClrMapping/>
+  </p:clrMapOvr>
+  <mc:AlternateContent xmlns:mc="http://schemas.openxmlformats.org/markup-compatibility/2006">
+    <mc:Choice xmlns:p14="http://schemas.microsoft.com/office/powerpoint/2010/main" Requires="p14">
+      <p:transition spd="med" p14:dur="650">
+        <p:fade thruBlk="1"/>
+      </p:transition>
+    </mc:Choice>
+    <mc:Fallback>
+      <p:transition xmlns:p14="http://schemas.microsoft.com/office/powerpoint/2010/main" spd="med">
+        <p:fade thruBlk="1"/>
+      </p:transition>
+    </mc:Fallback>
+  </mc:AlternateContent>
+  <p:timing>
+    <p:tnLst>
+      <p:par>
+        <p:cTn xmlns:p14="http://schemas.microsoft.com/office/powerpoint/2010/main" id="1" dur="indefinite" restart="never" nodeType="tmRoot">
+          <p:childTnLst>
+            <p:seq concurrent="1" nextAc="seek">
+              <p:cTn id="2" dur="indefinite" nodeType="mainSeq">
+                <p:childTnLst>
+                  <p:par>
+                    <p:cTn id="3" fill="hold">
+                      <p:stCondLst>
+                        <p:cond delay="indefinite"/>
+                      </p:stCondLst>
+                      <p:childTnLst>
+                        <p:par>
+                          <p:cTn id="4" fill="hold">
+                            <p:stCondLst>
+                              <p:cond delay="0"/>
+                            </p:stCondLst>
+                            <p:childTnLst>
+                              <p:par>
+                                <p:cTn id="5" presetID="9" presetClass="entr" presetSubtype="0" fill="hold" grpId="0" nodeType="clickEffect">
+                                  <p:stCondLst>
+                                    <p:cond delay="0"/>
+                                  </p:stCondLst>
+                                  <p:childTnLst>
+                                    <p:set>
+                                      <p:cBhvr>
+                                        <p:cTn id="6" dur="1" fill="hold">
+                                          <p:stCondLst>
+                                            <p:cond delay="0"/>
+                                          </p:stCondLst>
+                                        </p:cTn>
+                                        <p:tgtEl>
+                                          <p:spTgt spid="3">
+                                            <p:txEl>
+                                              <p:pRg st="1" end="1"/>
+                                            </p:txEl>
+                                          </p:spTgt>
+                                        </p:tgtEl>
+                                        <p:attrNameLst>
+                                          <p:attrName>style.visibility</p:attrName>
+                                        </p:attrNameLst>
+                                      </p:cBhvr>
+                                      <p:to>
+                                        <p:strVal val="visible"/>
+                                      </p:to>
+                                    </p:set>
+                                    <p:animEffect transition="in" filter="dissolve">
+                                      <p:cBhvr>
+                                        <p:cTn id="7" dur="500"/>
+                                        <p:tgtEl>
+                                          <p:spTgt spid="3">
+                                            <p:txEl>
+                                              <p:pRg st="1" end="1"/>
                                             </p:txEl>
                                           </p:spTgt>
                                         </p:tgtEl>
@@ -8533,7 +11478,7 @@
                             </p:stCondLst>
                             <p:childTnLst>
                               <p:par>
-                                <p:cTn id="10" presetID="9" presetClass="entr" presetSubtype="0" fill="hold" grpId="0" nodeType="clickEffect">
+                                <p:cTn id="10" presetID="15" presetClass="entr" presetSubtype="0" fill="hold" grpId="0" nodeType="clickEffect">
                                   <p:stCondLst>
                                     <p:cond delay="0"/>
                                   </p:stCondLst>
@@ -8541,67 +11486,6 @@
                                     <p:set>
                                       <p:cBhvr>
                                         <p:cTn id="11" dur="1" fill="hold">
-                                          <p:stCondLst>
-                                            <p:cond delay="0"/>
-                                          </p:stCondLst>
-                                        </p:cTn>
-                                        <p:tgtEl>
-                                          <p:spTgt spid="3">
-                                            <p:txEl>
-                                              <p:pRg st="1" end="1"/>
-                                            </p:txEl>
-                                          </p:spTgt>
-                                        </p:tgtEl>
-                                        <p:attrNameLst>
-                                          <p:attrName>style.visibility</p:attrName>
-                                        </p:attrNameLst>
-                                      </p:cBhvr>
-                                      <p:to>
-                                        <p:strVal val="visible"/>
-                                      </p:to>
-                                    </p:set>
-                                    <p:animEffect transition="in" filter="dissolve">
-                                      <p:cBhvr>
-                                        <p:cTn id="12" dur="500"/>
-                                        <p:tgtEl>
-                                          <p:spTgt spid="3">
-                                            <p:txEl>
-                                              <p:pRg st="1" end="1"/>
-                                            </p:txEl>
-                                          </p:spTgt>
-                                        </p:tgtEl>
-                                      </p:cBhvr>
-                                    </p:animEffect>
-                                  </p:childTnLst>
-                                </p:cTn>
-                              </p:par>
-                            </p:childTnLst>
-                          </p:cTn>
-                        </p:par>
-                      </p:childTnLst>
-                    </p:cTn>
-                  </p:par>
-                  <p:par>
-                    <p:cTn id="13" fill="hold">
-                      <p:stCondLst>
-                        <p:cond delay="indefinite"/>
-                      </p:stCondLst>
-                      <p:childTnLst>
-                        <p:par>
-                          <p:cTn id="14" fill="hold">
-                            <p:stCondLst>
-                              <p:cond delay="0"/>
-                            </p:stCondLst>
-                            <p:childTnLst>
-                              <p:par>
-                                <p:cTn id="15" presetID="15" presetClass="entr" presetSubtype="0" fill="hold" grpId="0" nodeType="clickEffect">
-                                  <p:stCondLst>
-                                    <p:cond delay="0"/>
-                                  </p:stCondLst>
-                                  <p:childTnLst>
-                                    <p:set>
-                                      <p:cBhvr>
-                                        <p:cTn id="16" dur="1" fill="hold">
                                           <p:stCondLst>
                                             <p:cond delay="0"/>
                                           </p:stCondLst>
@@ -8623,7 +11507,7 @@
                                     </p:set>
                                     <p:anim calcmode="lin" valueType="num">
                                       <p:cBhvr>
-                                        <p:cTn id="17" dur="1000" fill="hold"/>
+                                        <p:cTn id="12" dur="1000" fill="hold"/>
                                         <p:tgtEl>
                                           <p:spTgt spid="3">
                                             <p:txEl>
@@ -8650,7 +11534,7 @@
                                     </p:anim>
                                     <p:anim calcmode="lin" valueType="num">
                                       <p:cBhvr>
-                                        <p:cTn id="18" dur="1000" fill="hold"/>
+                                        <p:cTn id="13" dur="1000" fill="hold"/>
                                         <p:tgtEl>
                                           <p:spTgt spid="3">
                                             <p:txEl>
@@ -8677,7 +11561,7 @@
                                     </p:anim>
                                     <p:anim calcmode="lin" valueType="num">
                                       <p:cBhvr>
-                                        <p:cTn id="19" dur="1000" fill="hold"/>
+                                        <p:cTn id="14" dur="1000" fill="hold"/>
                                         <p:tgtEl>
                                           <p:spTgt spid="3">
                                             <p:txEl>
@@ -8704,7 +11588,7 @@
                                     </p:anim>
                                     <p:anim calcmode="lin" valueType="num">
                                       <p:cBhvr>
-                                        <p:cTn id="20" dur="1000" fill="hold"/>
+                                        <p:cTn id="15" dur="1000" fill="hold"/>
                                         <p:tgtEl>
                                           <p:spTgt spid="3">
                                             <p:txEl>
@@ -8766,7 +11650,7 @@
 </p:sld>
 </file>
 
-<file path=ppt/slides/slide13.xml><?xml version="1.0" encoding="utf-8"?>
+<file path=ppt/slides/slide17.xml><?xml version="1.0" encoding="utf-8"?>
 <p:sld xmlns:a="http://schemas.openxmlformats.org/drawingml/2006/main" xmlns:r="http://schemas.openxmlformats.org/officeDocument/2006/relationships" xmlns:p="http://schemas.openxmlformats.org/presentationml/2006/main" show="0">
   <p:cSld>
     <p:spTree>
@@ -9495,12 +12379,12 @@
   </p:clrMapOvr>
   <mc:AlternateContent xmlns:mc="http://schemas.openxmlformats.org/markup-compatibility/2006" xmlns:p14="http://schemas.microsoft.com/office/powerpoint/2010/main">
     <mc:Choice Requires="p14">
-      <p:transition p14:dur="100" advTm="5822">
+      <p:transition p14:dur="100">
         <p:cut/>
       </p:transition>
     </mc:Choice>
     <mc:Fallback xmlns="">
-      <p:transition xmlns:p14="http://schemas.microsoft.com/office/powerpoint/2010/main" advTm="5822">
+      <p:transition xmlns:p14="http://schemas.microsoft.com/office/powerpoint/2010/main">
         <p:cut/>
       </p:transition>
     </mc:Fallback>
@@ -9632,7 +12516,7 @@
 </p:sld>
 </file>
 
-<file path=ppt/slides/slide14.xml><?xml version="1.0" encoding="utf-8"?>
+<file path=ppt/slides/slide18.xml><?xml version="1.0" encoding="utf-8"?>
 <p:sld xmlns:a="http://schemas.openxmlformats.org/drawingml/2006/main" xmlns:r="http://schemas.openxmlformats.org/officeDocument/2006/relationships" xmlns:p="http://schemas.openxmlformats.org/presentationml/2006/main">
   <p:cSld>
     <p:spTree>
@@ -9671,7 +12555,7 @@
           <a:graphicData uri="http://schemas.openxmlformats.org/presentationml/2006/ole">
             <mc:AlternateContent xmlns:mc="http://schemas.openxmlformats.org/markup-compatibility/2006">
               <mc:Choice xmlns:v="urn:schemas-microsoft-com:vml" Requires="v">
-                <p:oleObj spid="_x0000_s55463" name="Equation" r:id="rId5" imgW="965200" imgH="495300" progId="Equation.3">
+                <p:oleObj spid="_x0000_s55489" name="Equation" r:id="rId5" imgW="965200" imgH="495300" progId="Equation.3">
                   <p:embed/>
                 </p:oleObj>
               </mc:Choice>
@@ -10154,7 +13038,7 @@
           <a:graphicData uri="http://schemas.openxmlformats.org/presentationml/2006/ole">
             <mc:AlternateContent xmlns:mc="http://schemas.openxmlformats.org/markup-compatibility/2006">
               <mc:Choice xmlns:v="urn:schemas-microsoft-com:vml" Requires="v">
-                <p:oleObj spid="_x0000_s55464" name="Equation" r:id="rId7" imgW="723900" imgH="228600" progId="Equation.DSMT4">
+                <p:oleObj spid="_x0000_s55490" name="Equation" r:id="rId7" imgW="723900" imgH="228600" progId="Equation.DSMT4">
                   <p:embed/>
                 </p:oleObj>
               </mc:Choice>
@@ -10216,7 +13100,7 @@
         </p:nvSpPr>
         <p:spPr>
           <a:xfrm>
-            <a:off x="5019709" y="3771826"/>
+            <a:off x="2150243" y="4741326"/>
             <a:ext cx="3687853" cy="769441"/>
           </a:xfrm>
           <a:prstGeom prst="rect">
@@ -10265,7 +13149,7 @@
           <a:graphicData uri="http://schemas.openxmlformats.org/presentationml/2006/ole">
             <mc:AlternateContent xmlns:mc="http://schemas.openxmlformats.org/markup-compatibility/2006">
               <mc:Choice xmlns:v="urn:schemas-microsoft-com:vml" Requires="v">
-                <p:oleObj spid="_x0000_s55465" name="Equation" r:id="rId9" imgW="825500" imgH="469900" progId="Equation.DSMT4">
+                <p:oleObj spid="_x0000_s55491" name="Equation" r:id="rId9" imgW="825500" imgH="469900" progId="Equation.DSMT4">
                   <p:embed/>
                 </p:oleObj>
               </mc:Choice>
@@ -10308,7 +13192,7 @@
   <p:clrMapOvr>
     <a:masterClrMapping/>
   </p:clrMapOvr>
-  <p:transition xmlns:p14="http://schemas.microsoft.com/office/powerpoint/2010/main" spd="slow" advTm="54984">
+  <p:transition xmlns:p14="http://schemas.microsoft.com/office/powerpoint/2010/main" spd="slow">
     <p:fade thruBlk="1"/>
   </p:transition>
   <p:timing>
@@ -10332,7 +13216,7 @@
                             </p:stCondLst>
                             <p:childTnLst>
                               <p:par>
-                                <p:cTn id="5" presetID="22" presetClass="entr" presetSubtype="8" fill="hold" nodeType="clickEffect">
+                                <p:cTn id="5" presetID="9" presetClass="entr" presetSubtype="0" fill="hold" nodeType="clickEffect">
                                   <p:stCondLst>
                                     <p:cond delay="0"/>
                                   </p:stCondLst>
@@ -10340,6 +13224,59 @@
                                     <p:set>
                                       <p:cBhvr>
                                         <p:cTn id="6" dur="1" fill="hold">
+                                          <p:stCondLst>
+                                            <p:cond delay="0"/>
+                                          </p:stCondLst>
+                                        </p:cTn>
+                                        <p:tgtEl>
+                                          <p:spTgt spid="3"/>
+                                        </p:tgtEl>
+                                        <p:attrNameLst>
+                                          <p:attrName>style.visibility</p:attrName>
+                                        </p:attrNameLst>
+                                      </p:cBhvr>
+                                      <p:to>
+                                        <p:strVal val="visible"/>
+                                      </p:to>
+                                    </p:set>
+                                    <p:animEffect transition="in" filter="dissolve">
+                                      <p:cBhvr>
+                                        <p:cTn id="7" dur="500"/>
+                                        <p:tgtEl>
+                                          <p:spTgt spid="3"/>
+                                        </p:tgtEl>
+                                      </p:cBhvr>
+                                    </p:animEffect>
+                                  </p:childTnLst>
+                                </p:cTn>
+                              </p:par>
+                            </p:childTnLst>
+                          </p:cTn>
+                        </p:par>
+                      </p:childTnLst>
+                    </p:cTn>
+                  </p:par>
+                  <p:par>
+                    <p:cTn id="8" fill="hold">
+                      <p:stCondLst>
+                        <p:cond delay="indefinite"/>
+                      </p:stCondLst>
+                      <p:childTnLst>
+                        <p:par>
+                          <p:cTn id="9" fill="hold">
+                            <p:stCondLst>
+                              <p:cond delay="0"/>
+                            </p:stCondLst>
+                            <p:childTnLst>
+                              <p:par>
+                                <p:cTn id="10" presetID="22" presetClass="entr" presetSubtype="8" fill="hold" nodeType="clickEffect">
+                                  <p:stCondLst>
+                                    <p:cond delay="0"/>
+                                  </p:stCondLst>
+                                  <p:childTnLst>
+                                    <p:set>
+                                      <p:cBhvr>
+                                        <p:cTn id="11" dur="1" fill="hold">
                                           <p:stCondLst>
                                             <p:cond delay="0"/>
                                           </p:stCondLst>
@@ -10357,7 +13294,7 @@
                                     </p:set>
                                     <p:animEffect transition="in" filter="wipe(left)">
                                       <p:cBhvr>
-                                        <p:cTn id="7" dur="500"/>
+                                        <p:cTn id="12" dur="500"/>
                                         <p:tgtEl>
                                           <p:spTgt spid="28"/>
                                         </p:tgtEl>
@@ -10370,20 +13307,20 @@
                           </p:cTn>
                         </p:par>
                         <p:par>
-                          <p:cTn id="8" fill="hold">
+                          <p:cTn id="13" fill="hold">
                             <p:stCondLst>
                               <p:cond delay="500"/>
                             </p:stCondLst>
                             <p:childTnLst>
                               <p:par>
-                                <p:cTn id="9" presetID="10" presetClass="entr" presetSubtype="0" fill="hold" nodeType="afterEffect">
+                                <p:cTn id="14" presetID="10" presetClass="entr" presetSubtype="0" fill="hold" nodeType="afterEffect">
                                   <p:stCondLst>
                                     <p:cond delay="0"/>
                                   </p:stCondLst>
                                   <p:childTnLst>
                                     <p:set>
                                       <p:cBhvr>
-                                        <p:cTn id="10" dur="1" fill="hold">
+                                        <p:cTn id="15" dur="1" fill="hold">
                                           <p:stCondLst>
                                             <p:cond delay="0"/>
                                           </p:stCondLst>
@@ -10401,62 +13338,9 @@
                                     </p:set>
                                     <p:animEffect transition="in" filter="fade">
                                       <p:cBhvr>
-                                        <p:cTn id="11" dur="500"/>
+                                        <p:cTn id="16" dur="500"/>
                                         <p:tgtEl>
                                           <p:spTgt spid="630787"/>
-                                        </p:tgtEl>
-                                      </p:cBhvr>
-                                    </p:animEffect>
-                                  </p:childTnLst>
-                                </p:cTn>
-                              </p:par>
-                            </p:childTnLst>
-                          </p:cTn>
-                        </p:par>
-                      </p:childTnLst>
-                    </p:cTn>
-                  </p:par>
-                  <p:par>
-                    <p:cTn id="12" fill="hold">
-                      <p:stCondLst>
-                        <p:cond delay="indefinite"/>
-                      </p:stCondLst>
-                      <p:childTnLst>
-                        <p:par>
-                          <p:cTn id="13" fill="hold">
-                            <p:stCondLst>
-                              <p:cond delay="0"/>
-                            </p:stCondLst>
-                            <p:childTnLst>
-                              <p:par>
-                                <p:cTn id="14" presetID="22" presetClass="entr" presetSubtype="8" fill="hold" nodeType="clickEffect">
-                                  <p:stCondLst>
-                                    <p:cond delay="0"/>
-                                  </p:stCondLst>
-                                  <p:childTnLst>
-                                    <p:set>
-                                      <p:cBhvr>
-                                        <p:cTn id="15" dur="1" fill="hold">
-                                          <p:stCondLst>
-                                            <p:cond delay="0"/>
-                                          </p:stCondLst>
-                                        </p:cTn>
-                                        <p:tgtEl>
-                                          <p:spTgt spid="4"/>
-                                        </p:tgtEl>
-                                        <p:attrNameLst>
-                                          <p:attrName>style.visibility</p:attrName>
-                                        </p:attrNameLst>
-                                      </p:cBhvr>
-                                      <p:to>
-                                        <p:strVal val="visible"/>
-                                      </p:to>
-                                    </p:set>
-                                    <p:animEffect transition="in" filter="wipe(left)">
-                                      <p:cBhvr>
-                                        <p:cTn id="16" dur="1000"/>
-                                        <p:tgtEl>
-                                          <p:spTgt spid="4"/>
                                         </p:tgtEl>
                                       </p:cBhvr>
                                     </p:animEffect>
@@ -10482,7 +13366,7 @@
                             </p:stCondLst>
                             <p:childTnLst>
                               <p:par>
-                                <p:cTn id="19" presetID="2" presetClass="entr" presetSubtype="9" fill="hold" grpId="0" nodeType="clickEffect">
+                                <p:cTn id="19" presetID="22" presetClass="entr" presetSubtype="8" fill="hold" nodeType="clickEffect">
                                   <p:stCondLst>
                                     <p:cond delay="0"/>
                                   </p:stCondLst>
@@ -10490,6 +13374,50 @@
                                     <p:set>
                                       <p:cBhvr>
                                         <p:cTn id="20" dur="1" fill="hold">
+                                          <p:stCondLst>
+                                            <p:cond delay="0"/>
+                                          </p:stCondLst>
+                                        </p:cTn>
+                                        <p:tgtEl>
+                                          <p:spTgt spid="4"/>
+                                        </p:tgtEl>
+                                        <p:attrNameLst>
+                                          <p:attrName>style.visibility</p:attrName>
+                                        </p:attrNameLst>
+                                      </p:cBhvr>
+                                      <p:to>
+                                        <p:strVal val="visible"/>
+                                      </p:to>
+                                    </p:set>
+                                    <p:animEffect transition="in" filter="wipe(left)">
+                                      <p:cBhvr>
+                                        <p:cTn id="21" dur="1000"/>
+                                        <p:tgtEl>
+                                          <p:spTgt spid="4"/>
+                                        </p:tgtEl>
+                                      </p:cBhvr>
+                                    </p:animEffect>
+                                  </p:childTnLst>
+                                </p:cTn>
+                              </p:par>
+                            </p:childTnLst>
+                          </p:cTn>
+                        </p:par>
+                        <p:par>
+                          <p:cTn id="22" fill="hold">
+                            <p:stCondLst>
+                              <p:cond delay="1000"/>
+                            </p:stCondLst>
+                            <p:childTnLst>
+                              <p:par>
+                                <p:cTn id="23" presetID="2" presetClass="entr" presetSubtype="9" fill="hold" grpId="0" nodeType="afterEffect">
+                                  <p:stCondLst>
+                                    <p:cond delay="0"/>
+                                  </p:stCondLst>
+                                  <p:childTnLst>
+                                    <p:set>
+                                      <p:cBhvr>
+                                        <p:cTn id="24" dur="1" fill="hold">
                                           <p:stCondLst>
                                             <p:cond delay="0"/>
                                           </p:stCondLst>
@@ -10507,7 +13435,7 @@
                                     </p:set>
                                     <p:anim calcmode="lin" valueType="num">
                                       <p:cBhvr additive="base">
-                                        <p:cTn id="21" dur="500" fill="hold"/>
+                                        <p:cTn id="25" dur="1000" fill="hold"/>
                                         <p:tgtEl>
                                           <p:spTgt spid="18"/>
                                         </p:tgtEl>
@@ -10530,7 +13458,7 @@
                                     </p:anim>
                                     <p:anim calcmode="lin" valueType="num">
                                       <p:cBhvr additive="base">
-                                        <p:cTn id="22" dur="500" fill="hold"/>
+                                        <p:cTn id="26" dur="1000" fill="hold"/>
                                         <p:tgtEl>
                                           <p:spTgt spid="18"/>
                                         </p:tgtEl>
@@ -10557,21 +13485,30 @@
                             </p:childTnLst>
                           </p:cTn>
                         </p:par>
+                      </p:childTnLst>
+                    </p:cTn>
+                  </p:par>
+                  <p:par>
+                    <p:cTn id="27" fill="hold">
+                      <p:stCondLst>
+                        <p:cond delay="indefinite"/>
+                      </p:stCondLst>
+                      <p:childTnLst>
                         <p:par>
-                          <p:cTn id="23" fill="hold">
+                          <p:cTn id="28" fill="hold">
                             <p:stCondLst>
-                              <p:cond delay="500"/>
+                              <p:cond delay="0"/>
                             </p:stCondLst>
                             <p:childTnLst>
                               <p:par>
-                                <p:cTn id="24" presetID="2" presetClass="entr" presetSubtype="1" fill="hold" grpId="0" nodeType="afterEffect">
+                                <p:cTn id="29" presetID="2" presetClass="entr" presetSubtype="1" fill="hold" grpId="0" nodeType="clickEffect">
                                   <p:stCondLst>
                                     <p:cond delay="0"/>
                                   </p:stCondLst>
                                   <p:childTnLst>
                                     <p:set>
                                       <p:cBhvr>
-                                        <p:cTn id="25" dur="1" fill="hold">
+                                        <p:cTn id="30" dur="1" fill="hold">
                                           <p:stCondLst>
                                             <p:cond delay="0"/>
                                           </p:stCondLst>
@@ -10589,7 +13526,7 @@
                                     </p:set>
                                     <p:anim calcmode="lin" valueType="num">
                                       <p:cBhvr additive="base">
-                                        <p:cTn id="26" dur="1000" fill="hold"/>
+                                        <p:cTn id="31" dur="1000" fill="hold"/>
                                         <p:tgtEl>
                                           <p:spTgt spid="2"/>
                                         </p:tgtEl>
@@ -10612,7 +13549,7 @@
                                     </p:anim>
                                     <p:anim calcmode="lin" valueType="num">
                                       <p:cBhvr additive="base">
-                                        <p:cTn id="27" dur="1000" fill="hold"/>
+                                        <p:cTn id="32" dur="1000" fill="hold"/>
                                         <p:tgtEl>
                                           <p:spTgt spid="2"/>
                                         </p:tgtEl>
@@ -10836,7 +13773,7 @@
   <p:clrMapOvr>
     <a:masterClrMapping/>
   </p:clrMapOvr>
-  <p:transition xmlns:p14="http://schemas.microsoft.com/office/powerpoint/2010/main" spd="slow" advTm="32125">
+  <p:transition xmlns:p14="http://schemas.microsoft.com/office/powerpoint/2010/main" spd="slow">
     <p:fade thruBlk="1"/>
   </p:transition>
   <p:timing>
@@ -11542,7 +14479,7 @@
           <a:graphicData uri="http://schemas.openxmlformats.org/presentationml/2006/ole">
             <mc:AlternateContent xmlns:mc="http://schemas.openxmlformats.org/markup-compatibility/2006">
               <mc:Choice xmlns:v="urn:schemas-microsoft-com:vml" Requires="v">
-                <p:oleObj spid="_x0000_s70736" name="Equation" r:id="rId5" imgW="457200" imgH="393700" progId="Equation.DSMT4">
+                <p:oleObj spid="_x0000_s70754" name="Equation" r:id="rId5" imgW="457200" imgH="393700" progId="Equation.DSMT4">
                   <p:embed/>
                 </p:oleObj>
               </mc:Choice>
@@ -11613,7 +14550,7 @@
             <a:graphicData uri="http://schemas.openxmlformats.org/presentationml/2006/ole">
               <mc:AlternateContent xmlns:mc="http://schemas.openxmlformats.org/markup-compatibility/2006">
                 <mc:Choice xmlns:v="urn:schemas-microsoft-com:vml" Requires="v">
-                  <p:oleObj spid="_x0000_s70737" name="Equation" r:id="rId7" imgW="444500" imgH="393700" progId="Equation.DSMT4">
+                  <p:oleObj spid="_x0000_s70755" name="Equation" r:id="rId7" imgW="444500" imgH="393700" progId="Equation.DSMT4">
                     <p:embed/>
                   </p:oleObj>
                 </mc:Choice>
@@ -11747,7 +14684,7 @@
   <p:clrMapOvr>
     <a:masterClrMapping/>
   </p:clrMapOvr>
-  <p:transition xmlns:p14="http://schemas.microsoft.com/office/powerpoint/2010/main" advTm="59181">
+  <p:transition xmlns:p14="http://schemas.microsoft.com/office/powerpoint/2010/main">
     <p:fade thruBlk="1"/>
   </p:transition>
   <p:timing>
@@ -12086,7 +15023,7 @@
           <a:graphicData uri="http://schemas.openxmlformats.org/presentationml/2006/ole">
             <mc:AlternateContent xmlns:mc="http://schemas.openxmlformats.org/markup-compatibility/2006">
               <mc:Choice xmlns:v="urn:schemas-microsoft-com:vml" Requires="v">
-                <p:oleObj spid="_x0000_s63540" name="Equation" r:id="rId4" imgW="1333500" imgH="393700" progId="Equation.DSMT4">
+                <p:oleObj spid="_x0000_s63550" name="Equation" r:id="rId4" imgW="1333500" imgH="393700" progId="Equation.DSMT4">
                   <p:embed/>
                 </p:oleObj>
               </mc:Choice>
@@ -14343,10 +17280,10 @@
   </p:clrMapOvr>
   <mc:AlternateContent xmlns:mc="http://schemas.openxmlformats.org/markup-compatibility/2006" xmlns:p14="http://schemas.microsoft.com/office/powerpoint/2010/main">
     <mc:Choice Requires="p14">
-      <p:transition spd="slow" p14:dur="2000" advTm="110152"/>
+      <p:transition spd="slow" p14:dur="2000"/>
     </mc:Choice>
     <mc:Fallback xmlns="">
-      <p:transition xmlns:p14="http://schemas.microsoft.com/office/powerpoint/2010/main" spd="slow" advTm="110152"/>
+      <p:transition xmlns:p14="http://schemas.microsoft.com/office/powerpoint/2010/main" spd="slow"/>
     </mc:Fallback>
   </mc:AlternateContent>
   <p:timing>
@@ -14630,7 +17567,7 @@
           <a:graphicData uri="http://schemas.openxmlformats.org/presentationml/2006/ole">
             <mc:AlternateContent xmlns:mc="http://schemas.openxmlformats.org/markup-compatibility/2006">
               <mc:Choice xmlns:v="urn:schemas-microsoft-com:vml" Requires="v">
-                <p:oleObj spid="_x0000_s71726" name="Equation" r:id="rId4" imgW="1333500" imgH="393700" progId="Equation.DSMT4">
+                <p:oleObj spid="_x0000_s71736" name="Equation" r:id="rId4" imgW="1333500" imgH="393700" progId="Equation.DSMT4">
                   <p:embed/>
                 </p:oleObj>
               </mc:Choice>
@@ -17153,10 +20090,10 @@
   </p:clrMapOvr>
   <mc:AlternateContent xmlns:mc="http://schemas.openxmlformats.org/markup-compatibility/2006" xmlns:p14="http://schemas.microsoft.com/office/powerpoint/2010/main">
     <mc:Choice Requires="p14">
-      <p:transition spd="slow" p14:dur="2000" advTm="22508"/>
+      <p:transition spd="slow" p14:dur="2000"/>
     </mc:Choice>
     <mc:Fallback xmlns="">
-      <p:transition xmlns:p14="http://schemas.microsoft.com/office/powerpoint/2010/main" spd="slow" advTm="22508"/>
+      <p:transition xmlns:p14="http://schemas.microsoft.com/office/powerpoint/2010/main" spd="slow"/>
     </mc:Fallback>
   </mc:AlternateContent>
   <p:timing>
@@ -18136,7 +21073,7 @@
           <a:graphicData uri="http://schemas.openxmlformats.org/presentationml/2006/ole">
             <mc:AlternateContent xmlns:mc="http://schemas.openxmlformats.org/markup-compatibility/2006">
               <mc:Choice xmlns:v="urn:schemas-microsoft-com:vml" Requires="v">
-                <p:oleObj spid="_x0000_s73815" name="Equation" r:id="rId4" imgW="1333500" imgH="393700" progId="Equation.DSMT4">
+                <p:oleObj spid="_x0000_s73833" name="Equation" r:id="rId4" imgW="1333500" imgH="393700" progId="Equation.DSMT4">
                   <p:embed/>
                 </p:oleObj>
               </mc:Choice>
@@ -18379,7 +21316,7 @@
           <a:graphicData uri="http://schemas.openxmlformats.org/presentationml/2006/ole">
             <mc:AlternateContent xmlns:mc="http://schemas.openxmlformats.org/markup-compatibility/2006">
               <mc:Choice xmlns:v="urn:schemas-microsoft-com:vml" Requires="v">
-                <p:oleObj spid="_x0000_s73816" name="Equation" r:id="rId6" imgW="457200" imgH="393700" progId="Equation.DSMT4">
+                <p:oleObj spid="_x0000_s73834" name="Equation" r:id="rId6" imgW="457200" imgH="393700" progId="Equation.DSMT4">
                   <p:embed/>
                 </p:oleObj>
               </mc:Choice>
@@ -18429,12 +21366,12 @@
   </p:clrMapOvr>
   <mc:AlternateContent xmlns:mc="http://schemas.openxmlformats.org/markup-compatibility/2006" xmlns:p14="http://schemas.microsoft.com/office/powerpoint/2010/main">
     <mc:Choice Requires="p14">
-      <p:transition spd="med" p14:dur="700" advTm="37704">
+      <p:transition spd="med" p14:dur="700">
         <p:fade/>
       </p:transition>
     </mc:Choice>
     <mc:Fallback xmlns="">
-      <p:transition xmlns:p14="http://schemas.microsoft.com/office/powerpoint/2010/main" spd="med" advTm="37704">
+      <p:transition xmlns:p14="http://schemas.microsoft.com/office/powerpoint/2010/main" spd="med">
         <p:fade/>
       </p:transition>
     </mc:Fallback>
@@ -19035,7 +21972,7 @@
           <a:graphicData uri="http://schemas.openxmlformats.org/presentationml/2006/ole">
             <mc:AlternateContent xmlns:mc="http://schemas.openxmlformats.org/markup-compatibility/2006">
               <mc:Choice xmlns:v="urn:schemas-microsoft-com:vml" Requires="v">
-                <p:oleObj spid="_x0000_s65644" name="Equation" r:id="rId3" imgW="1727200" imgH="393700" progId="Equation.DSMT4">
+                <p:oleObj spid="_x0000_s65670" name="Equation" r:id="rId3" imgW="1727200" imgH="393700" progId="Equation.DSMT4">
                   <p:embed/>
                 </p:oleObj>
               </mc:Choice>
@@ -19092,7 +22029,7 @@
           <a:graphicData uri="http://schemas.openxmlformats.org/presentationml/2006/ole">
             <mc:AlternateContent xmlns:mc="http://schemas.openxmlformats.org/markup-compatibility/2006">
               <mc:Choice xmlns:v="urn:schemas-microsoft-com:vml" Requires="v">
-                <p:oleObj spid="_x0000_s65645" name="Equation" r:id="rId5" imgW="1143000" imgH="228600" progId="Equation.3">
+                <p:oleObj spid="_x0000_s65671" name="Equation" r:id="rId5" imgW="1143000" imgH="228600" progId="Equation.3">
                   <p:embed/>
                 </p:oleObj>
               </mc:Choice>
@@ -19149,7 +22086,7 @@
           <a:graphicData uri="http://schemas.openxmlformats.org/presentationml/2006/ole">
             <mc:AlternateContent xmlns:mc="http://schemas.openxmlformats.org/markup-compatibility/2006">
               <mc:Choice xmlns:v="urn:schemas-microsoft-com:vml" Requires="v">
-                <p:oleObj spid="_x0000_s65646" name="Equation" r:id="rId7" imgW="698500" imgH="393700" progId="Equation.DSMT4">
+                <p:oleObj spid="_x0000_s65672" name="Equation" r:id="rId7" imgW="698500" imgH="393700" progId="Equation.DSMT4">
                   <p:embed/>
                 </p:oleObj>
               </mc:Choice>
@@ -19489,7 +22426,7 @@
           <a:graphicData uri="http://schemas.openxmlformats.org/presentationml/2006/ole">
             <mc:AlternateContent xmlns:mc="http://schemas.openxmlformats.org/markup-compatibility/2006">
               <mc:Choice xmlns:v="urn:schemas-microsoft-com:vml" Requires="v">
-                <p:oleObj spid="_x0000_s85046" name="Equation" r:id="rId4" imgW="457200" imgH="393700" progId="Equation.DSMT4">
+                <p:oleObj spid="_x0000_s85080" name="Equation" r:id="rId4" imgW="457200" imgH="393700" progId="Equation.DSMT4">
                   <p:embed/>
                 </p:oleObj>
               </mc:Choice>
@@ -19546,7 +22483,7 @@
           <a:graphicData uri="http://schemas.openxmlformats.org/presentationml/2006/ole">
             <mc:AlternateContent xmlns:mc="http://schemas.openxmlformats.org/markup-compatibility/2006">
               <mc:Choice xmlns:v="urn:schemas-microsoft-com:vml" Requires="v">
-                <p:oleObj spid="_x0000_s85047" name="Equation" r:id="rId6" imgW="2578100" imgH="393700" progId="Equation.DSMT4">
+                <p:oleObj spid="_x0000_s85081" name="Equation" r:id="rId6" imgW="2578100" imgH="393700" progId="Equation.DSMT4">
                   <p:embed/>
                 </p:oleObj>
               </mc:Choice>
@@ -19789,7 +22726,7 @@
           <a:graphicData uri="http://schemas.openxmlformats.org/presentationml/2006/ole">
             <mc:AlternateContent xmlns:mc="http://schemas.openxmlformats.org/markup-compatibility/2006">
               <mc:Choice xmlns:v="urn:schemas-microsoft-com:vml" Requires="v">
-                <p:oleObj spid="_x0000_s85048" name="Equation" r:id="rId8" imgW="914400" imgH="393700" progId="Equation.DSMT4">
+                <p:oleObj spid="_x0000_s85082" name="Equation" r:id="rId8" imgW="914400" imgH="393700" progId="Equation.DSMT4">
                   <p:embed/>
                 </p:oleObj>
               </mc:Choice>
@@ -19874,7 +22811,7 @@
           <a:graphicData uri="http://schemas.openxmlformats.org/presentationml/2006/ole">
             <mc:AlternateContent xmlns:mc="http://schemas.openxmlformats.org/markup-compatibility/2006">
               <mc:Choice xmlns:v="urn:schemas-microsoft-com:vml" Requires="v">
-                <p:oleObj spid="_x0000_s85049" name="Equation" r:id="rId10" imgW="1473200" imgH="482600" progId="Equation.3">
+                <p:oleObj spid="_x0000_s85083" name="Equation" r:id="rId10" imgW="1473200" imgH="482600" progId="Equation.3">
                   <p:embed/>
                 </p:oleObj>
               </mc:Choice>
@@ -20110,12 +23047,12 @@
   </p:clrMapOvr>
   <mc:AlternateContent xmlns:mc="http://schemas.openxmlformats.org/markup-compatibility/2006" xmlns:p14="http://schemas.microsoft.com/office/powerpoint/2010/main">
     <mc:Choice Requires="p14">
-      <p:transition spd="slow" p14:dur="1200" advTm="91570">
+      <p:transition spd="slow" p14:dur="1200">
         <p:fade/>
       </p:transition>
     </mc:Choice>
     <mc:Fallback xmlns="">
-      <p:transition xmlns:p14="http://schemas.microsoft.com/office/powerpoint/2010/main" spd="slow" advTm="91570">
+      <p:transition xmlns:p14="http://schemas.microsoft.com/office/powerpoint/2010/main" spd="slow">
         <p:fade/>
       </p:transition>
     </mc:Fallback>
@@ -20706,7 +23643,7 @@
   <p:clrMapOvr>
     <a:masterClrMapping/>
   </p:clrMapOvr>
-  <p:transition xmlns:p14="http://schemas.microsoft.com/office/powerpoint/2010/main" advTm="31835">
+  <p:transition xmlns:p14="http://schemas.microsoft.com/office/powerpoint/2010/main">
     <p:fade/>
   </p:transition>
   <p:timing>
@@ -20900,17 +23837,41 @@
 
 <file path=ppt/tags/tag11.xml><?xml version="1.0" encoding="utf-8"?>
 <p:tagLst xmlns:a="http://schemas.openxmlformats.org/drawingml/2006/main" xmlns:r="http://schemas.openxmlformats.org/officeDocument/2006/relationships" xmlns:p="http://schemas.openxmlformats.org/presentationml/2006/main">
-  <p:tag name="TIMING" val="|4.2|6|5"/>
+  <p:tag name="TIMING" val="|24.3|47.1|2.2|15.1"/>
 </p:tagLst>
 </file>
 
 <file path=ppt/tags/tag12.xml><?xml version="1.0" encoding="utf-8"?>
 <p:tagLst xmlns:a="http://schemas.openxmlformats.org/drawingml/2006/main" xmlns:r="http://schemas.openxmlformats.org/officeDocument/2006/relationships" xmlns:p="http://schemas.openxmlformats.org/presentationml/2006/main">
+  <p:tag name="TIMING" val="|24.3|47.1|2.2|15.1"/>
+</p:tagLst>
+</file>
+
+<file path=ppt/tags/tag13.xml><?xml version="1.0" encoding="utf-8"?>
+<p:tagLst xmlns:a="http://schemas.openxmlformats.org/drawingml/2006/main" xmlns:r="http://schemas.openxmlformats.org/officeDocument/2006/relationships" xmlns:p="http://schemas.openxmlformats.org/presentationml/2006/main">
+  <p:tag name="TIMING" val="|24.3|47.1|2.2|15.1"/>
+</p:tagLst>
+</file>
+
+<file path=ppt/tags/tag14.xml><?xml version="1.0" encoding="utf-8"?>
+<p:tagLst xmlns:a="http://schemas.openxmlformats.org/drawingml/2006/main" xmlns:r="http://schemas.openxmlformats.org/officeDocument/2006/relationships" xmlns:p="http://schemas.openxmlformats.org/presentationml/2006/main">
+  <p:tag name="TIMING" val="|24.3|47.1|2.2|15.1"/>
+</p:tagLst>
+</file>
+
+<file path=ppt/tags/tag15.xml><?xml version="1.0" encoding="utf-8"?>
+<p:tagLst xmlns:a="http://schemas.openxmlformats.org/drawingml/2006/main" xmlns:r="http://schemas.openxmlformats.org/officeDocument/2006/relationships" xmlns:p="http://schemas.openxmlformats.org/presentationml/2006/main">
+  <p:tag name="TIMING" val="|4.2|6|5"/>
+</p:tagLst>
+</file>
+
+<file path=ppt/tags/tag16.xml><?xml version="1.0" encoding="utf-8"?>
+<p:tagLst xmlns:a="http://schemas.openxmlformats.org/drawingml/2006/main" xmlns:r="http://schemas.openxmlformats.org/officeDocument/2006/relationships" xmlns:p="http://schemas.openxmlformats.org/presentationml/2006/main">
   <p:tag name="TIMING" val="|2.2"/>
 </p:tagLst>
 </file>
 
-<file path=ppt/tags/tag13.xml><?xml version="1.0" encoding="utf-8"?>
+<file path=ppt/tags/tag17.xml><?xml version="1.0" encoding="utf-8"?>
 <p:tagLst xmlns:a="http://schemas.openxmlformats.org/drawingml/2006/main" xmlns:r="http://schemas.openxmlformats.org/officeDocument/2006/relationships" xmlns:p="http://schemas.openxmlformats.org/presentationml/2006/main">
   <p:tag name="TIMING" val="|25.2|8.7|12.3"/>
 </p:tagLst>

</xml_diff>